<commit_message>
WIP for module 3
</commit_message>
<xml_diff>
--- a/Modules/03.handling-user-interaction/Slides.pptx
+++ b/Modules/03.handling-user-interaction/Slides.pptx
@@ -275,7 +275,7 @@
             <a:fld id="{923FAA13-3E1B-4A40-BCE0-2A4101C91A56}" type="datetimeFigureOut">
               <a:rPr lang="en-US" smtClean="0"/>
               <a:pPr/>
-              <a:t>4/26/2013</a:t>
+              <a:t>5/17/2013</a:t>
             </a:fld>
             <a:endParaRPr lang="en-US"/>
           </a:p>
@@ -991,214 +991,6 @@
           <a:bodyPr/>
           <a:lstStyle/>
           <a:p>
-            <a:r>
-              <a:rPr lang="en-US" dirty="0" smtClean="0"/>
-              <a:t>IN this module we will</a:t>
-            </a:r>
-            <a:r>
-              <a:rPr lang="en-US" baseline="0" dirty="0" smtClean="0"/>
-              <a:t> be</a:t>
-            </a:r>
-            <a:r>
-              <a:rPr lang="en-US" dirty="0" smtClean="0"/>
-              <a:t> focusing on learning and acquiring</a:t>
-            </a:r>
-            <a:r>
-              <a:rPr lang="en-US" baseline="0" dirty="0" smtClean="0"/>
-              <a:t> the skills needed to enable you to get started building your first HTML application.  </a:t>
-            </a:r>
-          </a:p>
-          <a:p>
-            <a:pPr marL="0" marR="0" indent="0" algn="l" defTabSz="914400" rtl="0" eaLnBrk="0" fontAlgn="base" latinLnBrk="0" hangingPunct="0">
-              <a:lnSpc>
-                <a:spcPct val="100000"/>
-              </a:lnSpc>
-              <a:spcBef>
-                <a:spcPct val="30000"/>
-              </a:spcBef>
-              <a:spcAft>
-                <a:spcPct val="0"/>
-              </a:spcAft>
-              <a:buClrTx/>
-              <a:buSzTx/>
-              <a:buFontTx/>
-              <a:buNone/>
-              <a:tabLst/>
-              <a:defRPr/>
-            </a:pPr>
-            <a:endParaRPr lang="en-US" baseline="0" dirty="0" smtClean="0"/>
-          </a:p>
-          <a:p>
-            <a:pPr marL="0" marR="0" indent="0" algn="l" defTabSz="914400" rtl="0" eaLnBrk="0" fontAlgn="base" latinLnBrk="0" hangingPunct="0">
-              <a:lnSpc>
-                <a:spcPct val="100000"/>
-              </a:lnSpc>
-              <a:spcBef>
-                <a:spcPct val="30000"/>
-              </a:spcBef>
-              <a:spcAft>
-                <a:spcPct val="0"/>
-              </a:spcAft>
-              <a:buClrTx/>
-              <a:buSzTx/>
-              <a:buFontTx/>
-              <a:buNone/>
-              <a:tabLst/>
-              <a:defRPr/>
-            </a:pPr>
-            <a:r>
-              <a:rPr lang="en-US" baseline="0" dirty="0" smtClean="0"/>
-              <a:t>[SHOW ANIMATION NOW]</a:t>
-            </a:r>
-          </a:p>
-          <a:p>
-            <a:endParaRPr lang="en-US" baseline="0" dirty="0" smtClean="0"/>
-          </a:p>
-          <a:p>
-            <a:r>
-              <a:rPr lang="en-US" baseline="0" dirty="0" smtClean="0"/>
-              <a:t>We will start off by taking a look at some of the various XAML or MVVM skills you have acquired and how they can be translated to HTML.  In fact we are going to focus on 4 core components what all XAML developers should understand.  Which are how to set the current data context for the current, how to do text or data binding, how to use commanding to handle user interaction and finally how to change the look and feel of your application by using style converters.</a:t>
-            </a:r>
-          </a:p>
-          <a:p>
-            <a:endParaRPr lang="en-US" baseline="0" dirty="0" smtClean="0"/>
-          </a:p>
-          <a:p>
-            <a:pPr marL="0" marR="0" indent="0" algn="l" defTabSz="914400" rtl="0" eaLnBrk="0" fontAlgn="base" latinLnBrk="0" hangingPunct="0">
-              <a:lnSpc>
-                <a:spcPct val="100000"/>
-              </a:lnSpc>
-              <a:spcBef>
-                <a:spcPct val="30000"/>
-              </a:spcBef>
-              <a:spcAft>
-                <a:spcPct val="0"/>
-              </a:spcAft>
-              <a:buClrTx/>
-              <a:buSzTx/>
-              <a:buFontTx/>
-              <a:buNone/>
-              <a:tabLst/>
-              <a:defRPr/>
-            </a:pPr>
-            <a:r>
-              <a:rPr lang="en-US" baseline="0" dirty="0" smtClean="0"/>
-              <a:t>[SHOW ANIMATION NOW]</a:t>
-            </a:r>
-          </a:p>
-          <a:p>
-            <a:endParaRPr lang="en-US" baseline="0" dirty="0" smtClean="0"/>
-          </a:p>
-          <a:p>
-            <a:r>
-              <a:rPr lang="en-US" baseline="0" dirty="0" smtClean="0"/>
-              <a:t>Next we will review all the tools and frameworks we will be utilizing in this course while making the transition from being a XAML developer to an HTML developer.</a:t>
-            </a:r>
-          </a:p>
-          <a:p>
-            <a:endParaRPr lang="en-US" baseline="0" dirty="0" smtClean="0"/>
-          </a:p>
-          <a:p>
-            <a:pPr marL="0" marR="0" indent="0" algn="l" defTabSz="914400" rtl="0" eaLnBrk="0" fontAlgn="base" latinLnBrk="0" hangingPunct="0">
-              <a:lnSpc>
-                <a:spcPct val="100000"/>
-              </a:lnSpc>
-              <a:spcBef>
-                <a:spcPct val="30000"/>
-              </a:spcBef>
-              <a:spcAft>
-                <a:spcPct val="0"/>
-              </a:spcAft>
-              <a:buClrTx/>
-              <a:buSzTx/>
-              <a:buFontTx/>
-              <a:buNone/>
-              <a:tabLst/>
-              <a:defRPr/>
-            </a:pPr>
-            <a:r>
-              <a:rPr lang="en-US" baseline="0" dirty="0" smtClean="0"/>
-              <a:t>[SHOW ANIMATION NOW]</a:t>
-            </a:r>
-          </a:p>
-          <a:p>
-            <a:endParaRPr lang="en-US" baseline="0" dirty="0" smtClean="0"/>
-          </a:p>
-          <a:p>
-            <a:r>
-              <a:rPr lang="en-US" baseline="0" dirty="0" smtClean="0"/>
-              <a:t>Following this we will actually crack open visual studio and create our first Asp.net MVC project, this will be the base template we will use for all of our coding demos in this course</a:t>
-            </a:r>
-          </a:p>
-          <a:p>
-            <a:endParaRPr lang="en-US" baseline="0" dirty="0" smtClean="0"/>
-          </a:p>
-          <a:p>
-            <a:pPr marL="0" marR="0" indent="0" algn="l" defTabSz="914400" rtl="0" eaLnBrk="0" fontAlgn="base" latinLnBrk="0" hangingPunct="0">
-              <a:lnSpc>
-                <a:spcPct val="100000"/>
-              </a:lnSpc>
-              <a:spcBef>
-                <a:spcPct val="30000"/>
-              </a:spcBef>
-              <a:spcAft>
-                <a:spcPct val="0"/>
-              </a:spcAft>
-              <a:buClrTx/>
-              <a:buSzTx/>
-              <a:buFontTx/>
-              <a:buNone/>
-              <a:tabLst/>
-              <a:defRPr/>
-            </a:pPr>
-            <a:r>
-              <a:rPr lang="en-US" baseline="0" dirty="0" smtClean="0"/>
-              <a:t>[SHOW ANIMATION NOW]</a:t>
-            </a:r>
-          </a:p>
-          <a:p>
-            <a:endParaRPr lang="en-US" baseline="0" dirty="0" smtClean="0"/>
-          </a:p>
-          <a:p>
-            <a:r>
-              <a:rPr lang="en-US" baseline="0" dirty="0" smtClean="0"/>
-              <a:t>After this will put all the pieces together and build a very simply hello world application to give you an example of what type of skills you will acquire in this course.</a:t>
-            </a:r>
-          </a:p>
-          <a:p>
-            <a:endParaRPr lang="en-US" baseline="0" dirty="0" smtClean="0"/>
-          </a:p>
-          <a:p>
-            <a:pPr marL="0" marR="0" indent="0" algn="l" defTabSz="914400" rtl="0" eaLnBrk="0" fontAlgn="base" latinLnBrk="0" hangingPunct="0">
-              <a:lnSpc>
-                <a:spcPct val="100000"/>
-              </a:lnSpc>
-              <a:spcBef>
-                <a:spcPct val="30000"/>
-              </a:spcBef>
-              <a:spcAft>
-                <a:spcPct val="0"/>
-              </a:spcAft>
-              <a:buClrTx/>
-              <a:buSzTx/>
-              <a:buFontTx/>
-              <a:buNone/>
-              <a:tabLst/>
-              <a:defRPr/>
-            </a:pPr>
-            <a:r>
-              <a:rPr lang="en-US" baseline="0" dirty="0" smtClean="0"/>
-              <a:t>[SHOW ANIMATION NOW]</a:t>
-            </a:r>
-          </a:p>
-          <a:p>
-            <a:endParaRPr lang="en-US" baseline="0" dirty="0" smtClean="0"/>
-          </a:p>
-          <a:p>
-            <a:r>
-              <a:rPr lang="en-US" baseline="0" dirty="0" smtClean="0"/>
-              <a:t>Finally we will end by reviewing the Silverlight application we are going to be porting as well as what the finally HTML version of this port is expected to look like.</a:t>
-            </a:r>
             <a:endParaRPr lang="en-US" dirty="0"/>
           </a:p>
         </p:txBody>
@@ -3518,11 +3310,7 @@
           <a:p>
             <a:r>
               <a:rPr lang="en-AU" dirty="0" smtClean="0"/>
-              <a:t>Knockout for </a:t>
-            </a:r>
-            <a:r>
-              <a:rPr lang="en-AU" dirty="0" smtClean="0"/>
-              <a:t>the XAML developer</a:t>
+              <a:t>Knockout for the XAML developer</a:t>
             </a:r>
             <a:endParaRPr lang="en-US" dirty="0"/>
           </a:p>
@@ -3545,11 +3333,7 @@
           <a:p>
             <a:r>
               <a:rPr lang="en-US" dirty="0" smtClean="0"/>
-              <a:t>Derik </a:t>
-            </a:r>
-            <a:r>
-              <a:rPr lang="en-US" dirty="0" smtClean="0"/>
-              <a:t>Whittaker</a:t>
+              <a:t>Derik Whittaker</a:t>
             </a:r>
           </a:p>
           <a:p>
@@ -3652,49 +3436,89 @@
               <a:rPr lang="en-US" dirty="0" smtClean="0">
                 <a:latin typeface="+mn-lt"/>
               </a:rPr>
-              <a:t>Learn how to leverage your XAML skills to build HTML applications</a:t>
-            </a:r>
+              <a:t>Handling Click Bindings</a:t>
+            </a:r>
+          </a:p>
+          <a:p>
+            <a:pPr lvl="1"/>
+            <a:r>
+              <a:rPr lang="en-US" dirty="0" smtClean="0">
+                <a:latin typeface="+mn-lt"/>
+              </a:rPr>
+              <a:t>Basic Bindings</a:t>
+            </a:r>
+          </a:p>
+          <a:p>
+            <a:pPr lvl="1"/>
+            <a:r>
+              <a:rPr lang="en-US" dirty="0" smtClean="0">
+                <a:latin typeface="+mn-lt"/>
+              </a:rPr>
+              <a:t>Bindings with Parameters</a:t>
+            </a:r>
+          </a:p>
+          <a:p>
+            <a:pPr lvl="1"/>
+            <a:r>
+              <a:rPr lang="en-US" dirty="0" smtClean="0">
+                <a:latin typeface="+mn-lt"/>
+              </a:rPr>
+              <a:t>Non-Button Click Bindings</a:t>
+            </a:r>
+          </a:p>
+          <a:p>
+            <a:pPr marL="457200" lvl="1" indent="0">
+              <a:buNone/>
+            </a:pPr>
+            <a:endParaRPr lang="en-US" dirty="0" smtClean="0">
+              <a:latin typeface="+mn-lt"/>
+            </a:endParaRPr>
           </a:p>
           <a:p>
             <a:r>
               <a:rPr lang="en-GB" dirty="0" smtClean="0"/>
-              <a:t>Learn about the tools we are going to use in this course</a:t>
-            </a:r>
+              <a:t>Setting Control Focus</a:t>
+            </a:r>
+          </a:p>
+          <a:p>
+            <a:pPr lvl="1"/>
+            <a:r>
+              <a:rPr lang="en-GB" dirty="0" smtClean="0">
+                <a:latin typeface="+mn-lt"/>
+              </a:rPr>
+              <a:t>Basic Bindings</a:t>
+            </a:r>
+          </a:p>
+          <a:p>
+            <a:pPr lvl="1"/>
+            <a:r>
+              <a:rPr lang="en-GB" dirty="0" smtClean="0">
+                <a:latin typeface="+mn-lt"/>
+              </a:rPr>
+              <a:t>Workflow based Bindings</a:t>
+            </a:r>
+          </a:p>
+          <a:p>
+            <a:pPr lvl="1"/>
+            <a:endParaRPr lang="en-GB" dirty="0" smtClean="0"/>
           </a:p>
           <a:p>
             <a:r>
               <a:rPr lang="en-GB" dirty="0" smtClean="0"/>
-              <a:t>Setup our template </a:t>
-            </a:r>
-            <a:r>
-              <a:rPr lang="en-GB" dirty="0" err="1" smtClean="0"/>
-              <a:t>Asp.Net</a:t>
-            </a:r>
-            <a:r>
-              <a:rPr lang="en-GB" dirty="0" smtClean="0"/>
-              <a:t> MVC project</a:t>
-            </a:r>
-          </a:p>
-          <a:p>
-            <a:r>
-              <a:rPr lang="en-GB" dirty="0" smtClean="0"/>
-              <a:t>Implement a Hello World </a:t>
-            </a:r>
-            <a:r>
-              <a:rPr lang="en-GB" dirty="0" err="1" smtClean="0"/>
-              <a:t>Asp.Net</a:t>
-            </a:r>
-            <a:r>
-              <a:rPr lang="en-GB" dirty="0" smtClean="0"/>
-              <a:t> MVC application</a:t>
-            </a:r>
-          </a:p>
-          <a:p>
-            <a:r>
-              <a:rPr lang="en-GB" dirty="0" smtClean="0"/>
-              <a:t>Review the application we will be building in this course</a:t>
-            </a:r>
-            <a:endParaRPr lang="en-GB" dirty="0"/>
+              <a:t>Event Bindings</a:t>
+            </a:r>
+          </a:p>
+          <a:p>
+            <a:pPr lvl="1"/>
+            <a:r>
+              <a:rPr lang="en-GB" dirty="0" smtClean="0">
+                <a:latin typeface="+mn-lt"/>
+              </a:rPr>
+              <a:t>Subscription Bindings</a:t>
+            </a:r>
+            <a:endParaRPr lang="en-GB" dirty="0">
+              <a:latin typeface="+mn-lt"/>
+            </a:endParaRPr>
           </a:p>
         </p:txBody>
       </p:sp>
@@ -3774,33 +3598,15 @@
                                   </p:childTnLst>
                                 </p:cTn>
                               </p:par>
-                            </p:childTnLst>
-                          </p:cTn>
-                        </p:par>
-                      </p:childTnLst>
-                    </p:cTn>
-                  </p:par>
-                  <p:par>
-                    <p:cTn id="8" fill="hold">
-                      <p:stCondLst>
-                        <p:cond delay="indefinite"/>
-                      </p:stCondLst>
-                      <p:childTnLst>
-                        <p:par>
-                          <p:cTn id="9" fill="hold">
-                            <p:stCondLst>
-                              <p:cond delay="0"/>
-                            </p:stCondLst>
-                            <p:childTnLst>
                               <p:par>
-                                <p:cTn id="10" presetID="10" presetClass="entr" presetSubtype="0" fill="hold" grpId="0" nodeType="clickEffect">
+                                <p:cTn id="8" presetID="10" presetClass="entr" presetSubtype="0" fill="hold" grpId="0" nodeType="withEffect">
                                   <p:stCondLst>
                                     <p:cond delay="0"/>
                                   </p:stCondLst>
                                   <p:childTnLst>
                                     <p:set>
                                       <p:cBhvr>
-                                        <p:cTn id="11" dur="1" fill="hold">
+                                        <p:cTn id="9" dur="1" fill="hold">
                                           <p:stCondLst>
                                             <p:cond delay="0"/>
                                           </p:stCondLst>
@@ -3822,7 +3628,7 @@
                                     </p:set>
                                     <p:animEffect transition="in" filter="fade">
                                       <p:cBhvr>
-                                        <p:cTn id="12" dur="500"/>
+                                        <p:cTn id="10" dur="500"/>
                                         <p:tgtEl>
                                           <p:spTgt spid="3">
                                             <p:txEl>
@@ -3835,33 +3641,15 @@
                                   </p:childTnLst>
                                 </p:cTn>
                               </p:par>
-                            </p:childTnLst>
-                          </p:cTn>
-                        </p:par>
-                      </p:childTnLst>
-                    </p:cTn>
-                  </p:par>
-                  <p:par>
-                    <p:cTn id="13" fill="hold">
-                      <p:stCondLst>
-                        <p:cond delay="indefinite"/>
-                      </p:stCondLst>
-                      <p:childTnLst>
-                        <p:par>
-                          <p:cTn id="14" fill="hold">
-                            <p:stCondLst>
-                              <p:cond delay="0"/>
-                            </p:stCondLst>
-                            <p:childTnLst>
                               <p:par>
-                                <p:cTn id="15" presetID="10" presetClass="entr" presetSubtype="0" fill="hold" grpId="0" nodeType="clickEffect">
+                                <p:cTn id="11" presetID="10" presetClass="entr" presetSubtype="0" fill="hold" grpId="0" nodeType="withEffect">
                                   <p:stCondLst>
                                     <p:cond delay="0"/>
                                   </p:stCondLst>
                                   <p:childTnLst>
                                     <p:set>
                                       <p:cBhvr>
-                                        <p:cTn id="16" dur="1" fill="hold">
+                                        <p:cTn id="12" dur="1" fill="hold">
                                           <p:stCondLst>
                                             <p:cond delay="0"/>
                                           </p:stCondLst>
@@ -3883,7 +3671,7 @@
                                     </p:set>
                                     <p:animEffect transition="in" filter="fade">
                                       <p:cBhvr>
-                                        <p:cTn id="17" dur="500"/>
+                                        <p:cTn id="13" dur="500"/>
                                         <p:tgtEl>
                                           <p:spTgt spid="3">
                                             <p:txEl>
@@ -3896,33 +3684,15 @@
                                   </p:childTnLst>
                                 </p:cTn>
                               </p:par>
-                            </p:childTnLst>
-                          </p:cTn>
-                        </p:par>
-                      </p:childTnLst>
-                    </p:cTn>
-                  </p:par>
-                  <p:par>
-                    <p:cTn id="18" fill="hold">
-                      <p:stCondLst>
-                        <p:cond delay="indefinite"/>
-                      </p:stCondLst>
-                      <p:childTnLst>
-                        <p:par>
-                          <p:cTn id="19" fill="hold">
-                            <p:stCondLst>
-                              <p:cond delay="0"/>
-                            </p:stCondLst>
-                            <p:childTnLst>
                               <p:par>
-                                <p:cTn id="20" presetID="10" presetClass="entr" presetSubtype="0" fill="hold" grpId="0" nodeType="clickEffect">
+                                <p:cTn id="14" presetID="10" presetClass="entr" presetSubtype="0" fill="hold" grpId="0" nodeType="withEffect">
                                   <p:stCondLst>
                                     <p:cond delay="0"/>
                                   </p:stCondLst>
                                   <p:childTnLst>
                                     <p:set>
                                       <p:cBhvr>
-                                        <p:cTn id="21" dur="1" fill="hold">
+                                        <p:cTn id="15" dur="1" fill="hold">
                                           <p:stCondLst>
                                             <p:cond delay="0"/>
                                           </p:stCondLst>
@@ -3944,7 +3714,7 @@
                                     </p:set>
                                     <p:animEffect transition="in" filter="fade">
                                       <p:cBhvr>
-                                        <p:cTn id="22" dur="500"/>
+                                        <p:cTn id="16" dur="500"/>
                                         <p:tgtEl>
                                           <p:spTgt spid="3">
                                             <p:txEl>
@@ -3964,19 +3734,105 @@
                     </p:cTn>
                   </p:par>
                   <p:par>
-                    <p:cTn id="23" fill="hold">
+                    <p:cTn id="17" fill="hold">
                       <p:stCondLst>
                         <p:cond delay="indefinite"/>
                       </p:stCondLst>
                       <p:childTnLst>
                         <p:par>
-                          <p:cTn id="24" fill="hold">
+                          <p:cTn id="18" fill="hold">
                             <p:stCondLst>
                               <p:cond delay="0"/>
                             </p:stCondLst>
                             <p:childTnLst>
                               <p:par>
-                                <p:cTn id="25" presetID="10" presetClass="entr" presetSubtype="0" fill="hold" grpId="0" nodeType="clickEffect">
+                                <p:cTn id="19" presetID="10" presetClass="entr" presetSubtype="0" fill="hold" grpId="0" nodeType="clickEffect">
+                                  <p:stCondLst>
+                                    <p:cond delay="0"/>
+                                  </p:stCondLst>
+                                  <p:childTnLst>
+                                    <p:set>
+                                      <p:cBhvr>
+                                        <p:cTn id="20" dur="1" fill="hold">
+                                          <p:stCondLst>
+                                            <p:cond delay="0"/>
+                                          </p:stCondLst>
+                                        </p:cTn>
+                                        <p:tgtEl>
+                                          <p:spTgt spid="3">
+                                            <p:txEl>
+                                              <p:pRg st="5" end="5"/>
+                                            </p:txEl>
+                                          </p:spTgt>
+                                        </p:tgtEl>
+                                        <p:attrNameLst>
+                                          <p:attrName>style.visibility</p:attrName>
+                                        </p:attrNameLst>
+                                      </p:cBhvr>
+                                      <p:to>
+                                        <p:strVal val="visible"/>
+                                      </p:to>
+                                    </p:set>
+                                    <p:animEffect transition="in" filter="fade">
+                                      <p:cBhvr>
+                                        <p:cTn id="21" dur="500"/>
+                                        <p:tgtEl>
+                                          <p:spTgt spid="3">
+                                            <p:txEl>
+                                              <p:pRg st="5" end="5"/>
+                                            </p:txEl>
+                                          </p:spTgt>
+                                        </p:tgtEl>
+                                      </p:cBhvr>
+                                    </p:animEffect>
+                                  </p:childTnLst>
+                                </p:cTn>
+                              </p:par>
+                              <p:par>
+                                <p:cTn id="22" presetID="10" presetClass="entr" presetSubtype="0" fill="hold" grpId="0" nodeType="withEffect">
+                                  <p:stCondLst>
+                                    <p:cond delay="0"/>
+                                  </p:stCondLst>
+                                  <p:childTnLst>
+                                    <p:set>
+                                      <p:cBhvr>
+                                        <p:cTn id="23" dur="1" fill="hold">
+                                          <p:stCondLst>
+                                            <p:cond delay="0"/>
+                                          </p:stCondLst>
+                                        </p:cTn>
+                                        <p:tgtEl>
+                                          <p:spTgt spid="3">
+                                            <p:txEl>
+                                              <p:pRg st="6" end="6"/>
+                                            </p:txEl>
+                                          </p:spTgt>
+                                        </p:tgtEl>
+                                        <p:attrNameLst>
+                                          <p:attrName>style.visibility</p:attrName>
+                                        </p:attrNameLst>
+                                      </p:cBhvr>
+                                      <p:to>
+                                        <p:strVal val="visible"/>
+                                      </p:to>
+                                    </p:set>
+                                    <p:animEffect transition="in" filter="fade">
+                                      <p:cBhvr>
+                                        <p:cTn id="24" dur="500"/>
+                                        <p:tgtEl>
+                                          <p:spTgt spid="3">
+                                            <p:txEl>
+                                              <p:pRg st="6" end="6"/>
+                                            </p:txEl>
+                                          </p:spTgt>
+                                        </p:tgtEl>
+                                      </p:cBhvr>
+                                    </p:animEffect>
+                                  </p:childTnLst>
+                                </p:cTn>
+                              </p:par>
+                              <p:par>
+                                <p:cTn id="25" presetID="10" presetClass="entr" presetSubtype="0" fill="hold" grpId="0" nodeType="withEffect">
                                   <p:stCondLst>
                                     <p:cond delay="0"/>
                                   </p:stCondLst>
@@ -3991,7 +3847,7 @@
                                         <p:tgtEl>
                                           <p:spTgt spid="3">
                                             <p:txEl>
-                                              <p:pRg st="4" end="4"/>
+                                              <p:pRg st="7" end="7"/>
                                             </p:txEl>
                                           </p:spTgt>
                                         </p:tgtEl>
@@ -4009,7 +3865,111 @@
                                         <p:tgtEl>
                                           <p:spTgt spid="3">
                                             <p:txEl>
-                                              <p:pRg st="4" end="4"/>
+                                              <p:pRg st="7" end="7"/>
+                                            </p:txEl>
+                                          </p:spTgt>
+                                        </p:tgtEl>
+                                      </p:cBhvr>
+                                    </p:animEffect>
+                                  </p:childTnLst>
+                                </p:cTn>
+                              </p:par>
+                            </p:childTnLst>
+                          </p:cTn>
+                        </p:par>
+                      </p:childTnLst>
+                    </p:cTn>
+                  </p:par>
+                  <p:par>
+                    <p:cTn id="28" fill="hold">
+                      <p:stCondLst>
+                        <p:cond delay="indefinite"/>
+                      </p:stCondLst>
+                      <p:childTnLst>
+                        <p:par>
+                          <p:cTn id="29" fill="hold">
+                            <p:stCondLst>
+                              <p:cond delay="0"/>
+                            </p:stCondLst>
+                            <p:childTnLst>
+                              <p:par>
+                                <p:cTn id="30" presetID="10" presetClass="entr" presetSubtype="0" fill="hold" grpId="0" nodeType="clickEffect">
+                                  <p:stCondLst>
+                                    <p:cond delay="0"/>
+                                  </p:stCondLst>
+                                  <p:childTnLst>
+                                    <p:set>
+                                      <p:cBhvr>
+                                        <p:cTn id="31" dur="1" fill="hold">
+                                          <p:stCondLst>
+                                            <p:cond delay="0"/>
+                                          </p:stCondLst>
+                                        </p:cTn>
+                                        <p:tgtEl>
+                                          <p:spTgt spid="3">
+                                            <p:txEl>
+                                              <p:pRg st="9" end="9"/>
+                                            </p:txEl>
+                                          </p:spTgt>
+                                        </p:tgtEl>
+                                        <p:attrNameLst>
+                                          <p:attrName>style.visibility</p:attrName>
+                                        </p:attrNameLst>
+                                      </p:cBhvr>
+                                      <p:to>
+                                        <p:strVal val="visible"/>
+                                      </p:to>
+                                    </p:set>
+                                    <p:animEffect transition="in" filter="fade">
+                                      <p:cBhvr>
+                                        <p:cTn id="32" dur="500"/>
+                                        <p:tgtEl>
+                                          <p:spTgt spid="3">
+                                            <p:txEl>
+                                              <p:pRg st="9" end="9"/>
+                                            </p:txEl>
+                                          </p:spTgt>
+                                        </p:tgtEl>
+                                      </p:cBhvr>
+                                    </p:animEffect>
+                                  </p:childTnLst>
+                                </p:cTn>
+                              </p:par>
+                              <p:par>
+                                <p:cTn id="33" presetID="10" presetClass="entr" presetSubtype="0" fill="hold" grpId="0" nodeType="withEffect">
+                                  <p:stCondLst>
+                                    <p:cond delay="0"/>
+                                  </p:stCondLst>
+                                  <p:childTnLst>
+                                    <p:set>
+                                      <p:cBhvr>
+                                        <p:cTn id="34" dur="1" fill="hold">
+                                          <p:stCondLst>
+                                            <p:cond delay="0"/>
+                                          </p:stCondLst>
+                                        </p:cTn>
+                                        <p:tgtEl>
+                                          <p:spTgt spid="3">
+                                            <p:txEl>
+                                              <p:pRg st="10" end="10"/>
+                                            </p:txEl>
+                                          </p:spTgt>
+                                        </p:tgtEl>
+                                        <p:attrNameLst>
+                                          <p:attrName>style.visibility</p:attrName>
+                                        </p:attrNameLst>
+                                      </p:cBhvr>
+                                      <p:to>
+                                        <p:strVal val="visible"/>
+                                      </p:to>
+                                    </p:set>
+                                    <p:animEffect transition="in" filter="fade">
+                                      <p:cBhvr>
+                                        <p:cTn id="35" dur="500"/>
+                                        <p:tgtEl>
+                                          <p:spTgt spid="3">
+                                            <p:txEl>
+                                              <p:pRg st="10" end="10"/>
                                             </p:txEl>
                                           </p:spTgt>
                                         </p:tgtEl>
@@ -4213,8 +4173,16 @@
                 </a:solidFill>
                 <a:latin typeface="+mn-lt"/>
               </a:rPr>
-              <a:t>Learn how to leverage your XAML skills to build HTML applications</a:t>
-            </a:r>
+              <a:t>Handling Click Bindings</a:t>
+            </a:r>
+            <a:endParaRPr lang="en-US" dirty="0" smtClean="0">
+              <a:solidFill>
+                <a:schemeClr val="accent6">
+                  <a:lumMod val="75000"/>
+                </a:schemeClr>
+              </a:solidFill>
+              <a:latin typeface="+mn-lt"/>
+            </a:endParaRPr>
           </a:p>
           <a:p>
             <a:r>
@@ -7020,21 +6988,6 @@
 </file>
 
 <file path=customXml/item1.xml><?xml version="1.0" encoding="utf-8"?>
-<p:properties xmlns:p="http://schemas.microsoft.com/office/2006/metadata/properties" xmlns:xsi="http://www.w3.org/2001/XMLSchema-instance">
-  <documentManagement/>
-</p:properties>
-</file>
-
-<file path=customXml/item2.xml><?xml version="1.0" encoding="utf-8"?>
-<?mso-contentType ?>
-<FormTemplates xmlns="http://schemas.microsoft.com/sharepoint/v3/contenttype/forms">
-  <Display>DocumentLibraryForm</Display>
-  <Edit>DocumentLibraryForm</Edit>
-  <New>DocumentLibraryForm</New>
-</FormTemplates>
-</file>
-
-<file path=customXml/item3.xml><?xml version="1.0" encoding="utf-8"?>
 <ct:contentTypeSchema xmlns:ct="http://schemas.microsoft.com/office/2006/metadata/contentType" xmlns:ma="http://schemas.microsoft.com/office/2006/metadata/properties/metaAttributes" ct:_="" ma:_="" ma:contentTypeName="Document" ma:contentTypeID="0x0101003865B9DCC8F7FB4A82840FBDE1FC983A" ma:contentTypeVersion="0" ma:contentTypeDescription="Create a new document." ma:contentTypeScope="" ma:versionID="ecd0916681f32cda70880b341f4a8911">
   <xsd:schema xmlns:xsd="http://www.w3.org/2001/XMLSchema" xmlns:p="http://schemas.microsoft.com/office/2006/metadata/properties" targetNamespace="http://schemas.microsoft.com/office/2006/metadata/properties" ma:root="true" ma:fieldsID="4aeb20c0e3442673af7ee10786458764">
     <xsd:element name="properties">
@@ -7083,16 +7036,32 @@
 </ct:contentTypeSchema>
 </file>
 
+<file path=customXml/item2.xml><?xml version="1.0" encoding="utf-8"?>
+<?mso-contentType ?>
+<FormTemplates xmlns="http://schemas.microsoft.com/sharepoint/v3/contenttype/forms">
+  <Display>DocumentLibraryForm</Display>
+  <Edit>DocumentLibraryForm</Edit>
+  <New>DocumentLibraryForm</New>
+</FormTemplates>
+</file>
+
+<file path=customXml/item3.xml><?xml version="1.0" encoding="utf-8"?>
+<p:properties xmlns:p="http://schemas.microsoft.com/office/2006/metadata/properties" xmlns:xsi="http://www.w3.org/2001/XMLSchema-instance">
+  <documentManagement/>
+</p:properties>
+</file>
+
 <file path=customXml/itemProps1.xml><?xml version="1.0" encoding="utf-8"?>
-<ds:datastoreItem xmlns:ds="http://schemas.openxmlformats.org/officeDocument/2006/customXml" ds:itemID="{2D498799-B0FC-4B7A-8396-BFC34D805990}">
+<ds:datastoreItem xmlns:ds="http://schemas.openxmlformats.org/officeDocument/2006/customXml" ds:itemID="{1DEB1AF8-B785-4B22-89EC-168618F34A5B}">
   <ds:schemaRefs>
+    <ds:schemaRef ds:uri="http://schemas.microsoft.com/office/2006/metadata/contentType"/>
+    <ds:schemaRef ds:uri="http://schemas.microsoft.com/office/2006/metadata/properties/metaAttributes"/>
+    <ds:schemaRef ds:uri="http://www.w3.org/2001/XMLSchema"/>
     <ds:schemaRef ds:uri="http://schemas.microsoft.com/office/2006/metadata/properties"/>
+    <ds:schemaRef ds:uri="http://schemas.openxmlformats.org/package/2006/metadata/core-properties"/>
+    <ds:schemaRef ds:uri="http://purl.org/dc/elements/1.1/"/>
     <ds:schemaRef ds:uri="http://purl.org/dc/terms/"/>
-    <ds:schemaRef ds:uri="http://www.w3.org/XML/1998/namespace"/>
-    <ds:schemaRef ds:uri="http://schemas.microsoft.com/office/2006/documentManagement/types"/>
-    <ds:schemaRef ds:uri="http://schemas.openxmlformats.org/package/2006/metadata/core-properties"/>
-    <ds:schemaRef ds:uri="http://purl.org/dc/dcmitype/"/>
-    <ds:schemaRef ds:uri="http://purl.org/dc/elements/1.1/"/>
+    <ds:schemaRef ds:uri="http://schemas.microsoft.com/office/internal/2005/internalDocumentation"/>
   </ds:schemaRefs>
 </ds:datastoreItem>
 </file>
@@ -7106,16 +7075,15 @@
 </file>
 
 <file path=customXml/itemProps3.xml><?xml version="1.0" encoding="utf-8"?>
-<ds:datastoreItem xmlns:ds="http://schemas.openxmlformats.org/officeDocument/2006/customXml" ds:itemID="{1DEB1AF8-B785-4B22-89EC-168618F34A5B}">
+<ds:datastoreItem xmlns:ds="http://schemas.openxmlformats.org/officeDocument/2006/customXml" ds:itemID="{2D498799-B0FC-4B7A-8396-BFC34D805990}">
   <ds:schemaRefs>
-    <ds:schemaRef ds:uri="http://schemas.microsoft.com/office/2006/metadata/contentType"/>
-    <ds:schemaRef ds:uri="http://schemas.microsoft.com/office/2006/metadata/properties/metaAttributes"/>
-    <ds:schemaRef ds:uri="http://www.w3.org/2001/XMLSchema"/>
     <ds:schemaRef ds:uri="http://schemas.microsoft.com/office/2006/metadata/properties"/>
+    <ds:schemaRef ds:uri="http://purl.org/dc/terms/"/>
+    <ds:schemaRef ds:uri="http://www.w3.org/XML/1998/namespace"/>
+    <ds:schemaRef ds:uri="http://schemas.microsoft.com/office/2006/documentManagement/types"/>
     <ds:schemaRef ds:uri="http://schemas.openxmlformats.org/package/2006/metadata/core-properties"/>
+    <ds:schemaRef ds:uri="http://purl.org/dc/dcmitype/"/>
     <ds:schemaRef ds:uri="http://purl.org/dc/elements/1.1/"/>
-    <ds:schemaRef ds:uri="http://purl.org/dc/terms/"/>
-    <ds:schemaRef ds:uri="http://schemas.microsoft.com/office/internal/2005/internalDocumentation"/>
   </ds:schemaRefs>
 </ds:datastoreItem>
 </file>
</xml_diff>

<commit_message>
adding module 3 code
</commit_message>
<xml_diff>
--- a/Modules/03.handling-user-interaction/Slides.pptx
+++ b/Modules/03.handling-user-interaction/Slides.pptx
@@ -5,10 +5,10 @@
     <p:sldMasterId id="2147483731" r:id="rId4"/>
   </p:sldMasterIdLst>
   <p:notesMasterIdLst>
-    <p:notesMasterId r:id="rId11"/>
+    <p:notesMasterId r:id="rId13"/>
   </p:notesMasterIdLst>
   <p:handoutMasterIdLst>
-    <p:handoutMasterId r:id="rId12"/>
+    <p:handoutMasterId r:id="rId14"/>
   </p:handoutMasterIdLst>
   <p:sldIdLst>
     <p:sldId id="356" r:id="rId5"/>
@@ -16,7 +16,9 @@
     <p:sldId id="370" r:id="rId7"/>
     <p:sldId id="376" r:id="rId8"/>
     <p:sldId id="358" r:id="rId9"/>
-    <p:sldId id="378" r:id="rId10"/>
+    <p:sldId id="380" r:id="rId10"/>
+    <p:sldId id="379" r:id="rId11"/>
+    <p:sldId id="378" r:id="rId12"/>
   </p:sldIdLst>
   <p:sldSz cx="9144000" cy="6858000" type="screen4x3"/>
   <p:notesSz cx="7315200" cy="9601200"/>
@@ -155,6 +157,8 @@
             <p14:sldId id="370"/>
             <p14:sldId id="376"/>
             <p14:sldId id="358"/>
+            <p14:sldId id="380"/>
+            <p14:sldId id="379"/>
             <p14:sldId id="378"/>
           </p14:sldIdLst>
         </p14:section>
@@ -1269,134 +1273,6 @@
           <a:bodyPr/>
           <a:lstStyle/>
           <a:p>
-            <a:r>
-              <a:rPr lang="en-US" dirty="0" smtClean="0"/>
-              <a:t>When</a:t>
-            </a:r>
-            <a:r>
-              <a:rPr lang="en-US" baseline="0" dirty="0" smtClean="0"/>
-              <a:t> we talk about how you can leverage your existing XAML skills while building HTML applications we might as well as start with the basics and ask ‘how do I bind my View Model to the View’.  </a:t>
-            </a:r>
-          </a:p>
-          <a:p>
-            <a:endParaRPr lang="en-US" baseline="0" dirty="0" smtClean="0"/>
-          </a:p>
-          <a:p>
-            <a:pPr marL="0" marR="0" indent="0" algn="l" defTabSz="914400" rtl="0" eaLnBrk="0" fontAlgn="base" latinLnBrk="0" hangingPunct="0">
-              <a:lnSpc>
-                <a:spcPct val="100000"/>
-              </a:lnSpc>
-              <a:spcBef>
-                <a:spcPct val="30000"/>
-              </a:spcBef>
-              <a:spcAft>
-                <a:spcPct val="0"/>
-              </a:spcAft>
-              <a:buClrTx/>
-              <a:buSzTx/>
-              <a:buFontTx/>
-              <a:buNone/>
-              <a:tabLst/>
-              <a:defRPr/>
-            </a:pPr>
-            <a:r>
-              <a:rPr lang="en-US" baseline="0" dirty="0" smtClean="0"/>
-              <a:t>[SHOW ANIMATION NOW]</a:t>
-            </a:r>
-          </a:p>
-          <a:p>
-            <a:endParaRPr lang="en-US" baseline="0" dirty="0" smtClean="0"/>
-          </a:p>
-          <a:p>
-            <a:r>
-              <a:rPr lang="en-US" baseline="0" dirty="0" smtClean="0"/>
-              <a:t>In XAML, assuming your not using some sort of View Model locator the binding code in your code behind would look something like what is being shown on screen.</a:t>
-            </a:r>
-          </a:p>
-          <a:p>
-            <a:r>
-              <a:rPr lang="en-US" baseline="0" dirty="0" smtClean="0"/>
-              <a:t>You would navigate to the constructor of your given view.</a:t>
-            </a:r>
-          </a:p>
-          <a:p>
-            <a:r>
-              <a:rPr lang="en-US" baseline="0" dirty="0" smtClean="0"/>
-              <a:t>You would new up an instance of the correct View Model and assign it to the </a:t>
-            </a:r>
-            <a:r>
-              <a:rPr lang="en-US" baseline="0" dirty="0" err="1" smtClean="0"/>
-              <a:t>DataContext</a:t>
-            </a:r>
-            <a:r>
-              <a:rPr lang="en-US" baseline="0" dirty="0" smtClean="0"/>
-              <a:t> for the view</a:t>
-            </a:r>
-          </a:p>
-          <a:p>
-            <a:endParaRPr lang="en-US" baseline="0" dirty="0" smtClean="0"/>
-          </a:p>
-          <a:p>
-            <a:r>
-              <a:rPr lang="en-US" baseline="0" dirty="0" smtClean="0"/>
-              <a:t>We know how we binding our View and </a:t>
-            </a:r>
-            <a:r>
-              <a:rPr lang="en-US" baseline="0" dirty="0" err="1" smtClean="0"/>
-              <a:t>ViewModel</a:t>
-            </a:r>
-            <a:r>
-              <a:rPr lang="en-US" baseline="0" dirty="0" smtClean="0"/>
-              <a:t> in XAML, how do we do this in HTML</a:t>
-            </a:r>
-          </a:p>
-          <a:p>
-            <a:endParaRPr lang="en-US" baseline="0" dirty="0" smtClean="0"/>
-          </a:p>
-          <a:p>
-            <a:r>
-              <a:rPr lang="en-US" baseline="0" dirty="0" smtClean="0"/>
-              <a:t>In HTML you do something very similar, if you notice the XAML and HTML/Knockout code indeed look very similar.  The </a:t>
-            </a:r>
-            <a:r>
-              <a:rPr lang="en-US" baseline="0" dirty="0" err="1" smtClean="0"/>
-              <a:t>ko.applyBindings</a:t>
-            </a:r>
-            <a:r>
-              <a:rPr lang="en-US" baseline="0" dirty="0" smtClean="0"/>
-              <a:t> syntax is how we use Knockout </a:t>
-            </a:r>
-            <a:r>
-              <a:rPr lang="en-US" baseline="0" dirty="0" err="1" smtClean="0"/>
-              <a:t>js</a:t>
-            </a:r>
-            <a:r>
-              <a:rPr lang="en-US" baseline="0" dirty="0" smtClean="0"/>
-              <a:t> to do our context binding, I am not going to spend any time on this right now as we will explore knockout in greater depth in an upcoming module.</a:t>
-            </a:r>
-          </a:p>
-          <a:p>
-            <a:endParaRPr lang="en-US" baseline="0" dirty="0" smtClean="0"/>
-          </a:p>
-          <a:p>
-            <a:r>
-              <a:rPr lang="en-US" baseline="0" dirty="0" smtClean="0"/>
-              <a:t>In HTML we would create a script block at bottom of our HTML page as seen here.</a:t>
-            </a:r>
-          </a:p>
-          <a:p>
-            <a:r>
-              <a:rPr lang="en-US" baseline="0" dirty="0" smtClean="0"/>
-              <a:t>We would then new up an instance of our JavaScript based view model.  Once we have our View Model we would us </a:t>
-            </a:r>
-            <a:r>
-              <a:rPr lang="en-US" baseline="0" dirty="0" err="1" smtClean="0"/>
-              <a:t>Knockoutjs</a:t>
-            </a:r>
-            <a:r>
-              <a:rPr lang="en-US" baseline="0" dirty="0" smtClean="0"/>
-              <a:t> to bind the View to the View Model.</a:t>
-            </a:r>
             <a:endParaRPr lang="en-US" dirty="0"/>
           </a:p>
         </p:txBody>
@@ -1487,100 +1363,6 @@
           <a:bodyPr/>
           <a:lstStyle/>
           <a:p>
-            <a:r>
-              <a:rPr lang="en-US" dirty="0" smtClean="0"/>
-              <a:t>In this module we explored</a:t>
-            </a:r>
-            <a:r>
-              <a:rPr lang="en-US" baseline="0" dirty="0" smtClean="0"/>
-              <a:t> everything we needed to know in order to get primed for making the transition from being a XAML developer to an HTML developer.  </a:t>
-            </a:r>
-          </a:p>
-          <a:p>
-            <a:endParaRPr lang="en-US" baseline="0" dirty="0" smtClean="0"/>
-          </a:p>
-          <a:p>
-            <a:r>
-              <a:rPr lang="en-US" baseline="0" dirty="0" smtClean="0"/>
-              <a:t>We took a look at how some of you </a:t>
-            </a:r>
-            <a:r>
-              <a:rPr lang="en-US" baseline="0" dirty="0" err="1" smtClean="0"/>
-              <a:t>xaml</a:t>
-            </a:r>
-            <a:r>
-              <a:rPr lang="en-US" baseline="0" dirty="0" smtClean="0"/>
-              <a:t> skills, such as binding and commanding, can easily translate to building HTML applications</a:t>
-            </a:r>
-          </a:p>
-          <a:p>
-            <a:endParaRPr lang="en-US" baseline="0" dirty="0" smtClean="0"/>
-          </a:p>
-          <a:p>
-            <a:r>
-              <a:rPr lang="en-US" baseline="0" dirty="0" smtClean="0"/>
-              <a:t>We learned about many of the tools we will be using through this course, such as Knockout </a:t>
-            </a:r>
-            <a:r>
-              <a:rPr lang="en-US" baseline="0" dirty="0" err="1" smtClean="0"/>
-              <a:t>js</a:t>
-            </a:r>
-            <a:r>
-              <a:rPr lang="en-US" baseline="0" dirty="0" smtClean="0"/>
-              <a:t>, typescript and </a:t>
-            </a:r>
-            <a:r>
-              <a:rPr lang="en-US" baseline="0" dirty="0" err="1" smtClean="0"/>
-              <a:t>ASP.Net</a:t>
-            </a:r>
-            <a:r>
-              <a:rPr lang="en-US" baseline="0" dirty="0" smtClean="0"/>
-              <a:t> MVC</a:t>
-            </a:r>
-          </a:p>
-          <a:p>
-            <a:endParaRPr lang="en-US" baseline="0" dirty="0" smtClean="0"/>
-          </a:p>
-          <a:p>
-            <a:r>
-              <a:rPr lang="en-US" baseline="0" dirty="0" smtClean="0"/>
-              <a:t>We built our </a:t>
-            </a:r>
-            <a:r>
-              <a:rPr lang="en-US" baseline="0" dirty="0" err="1" smtClean="0"/>
-              <a:t>Asp.Net</a:t>
-            </a:r>
-            <a:r>
-              <a:rPr lang="en-US" baseline="0" dirty="0" smtClean="0"/>
-              <a:t> MVC template project which we will use as our base project during this course</a:t>
-            </a:r>
-          </a:p>
-          <a:p>
-            <a:endParaRPr lang="en-US" baseline="0" dirty="0" smtClean="0"/>
-          </a:p>
-          <a:p>
-            <a:r>
-              <a:rPr lang="en-US" baseline="0" dirty="0" smtClean="0"/>
-              <a:t>We built a very simple hello world application to demonstrate how to use some of the tools we will be learning about during this course</a:t>
-            </a:r>
-          </a:p>
-          <a:p>
-            <a:endParaRPr lang="en-US" baseline="0" dirty="0" smtClean="0"/>
-          </a:p>
-          <a:p>
-            <a:r>
-              <a:rPr lang="en-US" baseline="0" dirty="0" smtClean="0"/>
-              <a:t>We ended up by reviewing our reference Silverlight application we are going to be porting over to html in order to better understand our objectives for the course</a:t>
-            </a:r>
-          </a:p>
-          <a:p>
-            <a:endParaRPr lang="en-US" baseline="0" dirty="0" smtClean="0"/>
-          </a:p>
-          <a:p>
-            <a:r>
-              <a:rPr lang="en-US" baseline="0" dirty="0" smtClean="0"/>
-              <a:t>In the next module we will dive straight in and start the actual port of our reference application to html</a:t>
-            </a:r>
             <a:endParaRPr lang="en-US" dirty="0"/>
           </a:p>
         </p:txBody>
@@ -1609,6 +1391,288 @@
                 <a:defRPr/>
               </a:pPr>
               <a:t>6</a:t>
+            </a:fld>
+            <a:endParaRPr lang="en-US"/>
+          </a:p>
+        </p:txBody>
+      </p:sp>
+    </p:spTree>
+    <p:extLst>
+      <p:ext uri="{BB962C8B-B14F-4D97-AF65-F5344CB8AC3E}">
+        <p14:creationId xmlns:p14="http://schemas.microsoft.com/office/powerpoint/2010/main" val="199185894"/>
+      </p:ext>
+    </p:extLst>
+  </p:cSld>
+  <p:clrMapOvr>
+    <a:masterClrMapping/>
+  </p:clrMapOvr>
+</p:notes>
+</file>
+
+<file path=ppt/notesSlides/notesSlide7.xml><?xml version="1.0" encoding="utf-8"?>
+<p:notes xmlns:a="http://schemas.openxmlformats.org/drawingml/2006/main" xmlns:r="http://schemas.openxmlformats.org/officeDocument/2006/relationships" xmlns:p="http://schemas.openxmlformats.org/presentationml/2006/main">
+  <p:cSld>
+    <p:spTree>
+      <p:nvGrpSpPr>
+        <p:cNvPr id="1" name=""/>
+        <p:cNvGrpSpPr/>
+        <p:nvPr/>
+      </p:nvGrpSpPr>
+      <p:grpSpPr>
+        <a:xfrm>
+          <a:off x="0" y="0"/>
+          <a:ext cx="0" cy="0"/>
+          <a:chOff x="0" y="0"/>
+          <a:chExt cx="0" cy="0"/>
+        </a:xfrm>
+      </p:grpSpPr>
+      <p:sp>
+        <p:nvSpPr>
+          <p:cNvPr id="2" name="Slide Image Placeholder 1"/>
+          <p:cNvSpPr>
+            <a:spLocks noGrp="1" noRot="1" noChangeAspect="1"/>
+          </p:cNvSpPr>
+          <p:nvPr>
+            <p:ph type="sldImg"/>
+          </p:nvPr>
+        </p:nvSpPr>
+        <p:spPr/>
+      </p:sp>
+      <p:sp>
+        <p:nvSpPr>
+          <p:cNvPr id="3" name="Notes Placeholder 2"/>
+          <p:cNvSpPr>
+            <a:spLocks noGrp="1"/>
+          </p:cNvSpPr>
+          <p:nvPr>
+            <p:ph type="body" idx="1"/>
+          </p:nvPr>
+        </p:nvSpPr>
+        <p:spPr/>
+        <p:txBody>
+          <a:bodyPr/>
+          <a:lstStyle/>
+          <a:p>
+            <a:endParaRPr lang="en-US" dirty="0"/>
+          </a:p>
+        </p:txBody>
+      </p:sp>
+      <p:sp>
+        <p:nvSpPr>
+          <p:cNvPr id="4" name="Slide Number Placeholder 3"/>
+          <p:cNvSpPr>
+            <a:spLocks noGrp="1"/>
+          </p:cNvSpPr>
+          <p:nvPr>
+            <p:ph type="sldNum" sz="quarter" idx="10"/>
+          </p:nvPr>
+        </p:nvSpPr>
+        <p:spPr/>
+        <p:txBody>
+          <a:bodyPr/>
+          <a:lstStyle/>
+          <a:p>
+            <a:pPr>
+              <a:defRPr/>
+            </a:pPr>
+            <a:fld id="{47C584BF-6945-4E60-B2A7-1638FF8EA8EE}" type="slidenum">
+              <a:rPr lang="en-US" smtClean="0">
+                <a:solidFill>
+                  <a:srgbClr val="000000"/>
+                </a:solidFill>
+              </a:rPr>
+              <a:pPr>
+                <a:defRPr/>
+              </a:pPr>
+              <a:t>7</a:t>
+            </a:fld>
+            <a:endParaRPr lang="en-US">
+              <a:solidFill>
+                <a:srgbClr val="000000"/>
+              </a:solidFill>
+            </a:endParaRPr>
+          </a:p>
+        </p:txBody>
+      </p:sp>
+    </p:spTree>
+    <p:extLst>
+      <p:ext uri="{BB962C8B-B14F-4D97-AF65-F5344CB8AC3E}">
+        <p14:creationId xmlns:p14="http://schemas.microsoft.com/office/powerpoint/2010/main" val="2617840120"/>
+      </p:ext>
+    </p:extLst>
+  </p:cSld>
+  <p:clrMapOvr>
+    <a:masterClrMapping/>
+  </p:clrMapOvr>
+</p:notes>
+</file>
+
+<file path=ppt/notesSlides/notesSlide8.xml><?xml version="1.0" encoding="utf-8"?>
+<p:notes xmlns:a="http://schemas.openxmlformats.org/drawingml/2006/main" xmlns:r="http://schemas.openxmlformats.org/officeDocument/2006/relationships" xmlns:p="http://schemas.openxmlformats.org/presentationml/2006/main">
+  <p:cSld>
+    <p:spTree>
+      <p:nvGrpSpPr>
+        <p:cNvPr id="1" name=""/>
+        <p:cNvGrpSpPr/>
+        <p:nvPr/>
+      </p:nvGrpSpPr>
+      <p:grpSpPr>
+        <a:xfrm>
+          <a:off x="0" y="0"/>
+          <a:ext cx="0" cy="0"/>
+          <a:chOff x="0" y="0"/>
+          <a:chExt cx="0" cy="0"/>
+        </a:xfrm>
+      </p:grpSpPr>
+      <p:sp>
+        <p:nvSpPr>
+          <p:cNvPr id="2" name="Slide Image Placeholder 1"/>
+          <p:cNvSpPr>
+            <a:spLocks noGrp="1" noRot="1" noChangeAspect="1"/>
+          </p:cNvSpPr>
+          <p:nvPr>
+            <p:ph type="sldImg"/>
+          </p:nvPr>
+        </p:nvSpPr>
+        <p:spPr/>
+      </p:sp>
+      <p:sp>
+        <p:nvSpPr>
+          <p:cNvPr id="3" name="Notes Placeholder 2"/>
+          <p:cNvSpPr>
+            <a:spLocks noGrp="1"/>
+          </p:cNvSpPr>
+          <p:nvPr>
+            <p:ph type="body" idx="1"/>
+          </p:nvPr>
+        </p:nvSpPr>
+        <p:spPr/>
+        <p:txBody>
+          <a:bodyPr/>
+          <a:lstStyle/>
+          <a:p>
+            <a:r>
+              <a:rPr lang="en-US" dirty="0" smtClean="0"/>
+              <a:t>In this module we explored</a:t>
+            </a:r>
+            <a:r>
+              <a:rPr lang="en-US" baseline="0" dirty="0" smtClean="0"/>
+              <a:t> everything we needed to know in order to get primed for making the transition from being a XAML developer to an HTML developer.  </a:t>
+            </a:r>
+          </a:p>
+          <a:p>
+            <a:endParaRPr lang="en-US" baseline="0" dirty="0" smtClean="0"/>
+          </a:p>
+          <a:p>
+            <a:r>
+              <a:rPr lang="en-US" baseline="0" dirty="0" smtClean="0"/>
+              <a:t>We took a look at how some of you </a:t>
+            </a:r>
+            <a:r>
+              <a:rPr lang="en-US" baseline="0" dirty="0" err="1" smtClean="0"/>
+              <a:t>xaml</a:t>
+            </a:r>
+            <a:r>
+              <a:rPr lang="en-US" baseline="0" dirty="0" smtClean="0"/>
+              <a:t> skills, such as binding and commanding, can easily translate to building HTML applications</a:t>
+            </a:r>
+          </a:p>
+          <a:p>
+            <a:endParaRPr lang="en-US" baseline="0" dirty="0" smtClean="0"/>
+          </a:p>
+          <a:p>
+            <a:r>
+              <a:rPr lang="en-US" baseline="0" dirty="0" smtClean="0"/>
+              <a:t>We learned about many of the tools we will be using through this course, such as Knockout </a:t>
+            </a:r>
+            <a:r>
+              <a:rPr lang="en-US" baseline="0" dirty="0" err="1" smtClean="0"/>
+              <a:t>js</a:t>
+            </a:r>
+            <a:r>
+              <a:rPr lang="en-US" baseline="0" dirty="0" smtClean="0"/>
+              <a:t>, typescript and </a:t>
+            </a:r>
+            <a:r>
+              <a:rPr lang="en-US" baseline="0" dirty="0" err="1" smtClean="0"/>
+              <a:t>ASP.Net</a:t>
+            </a:r>
+            <a:r>
+              <a:rPr lang="en-US" baseline="0" dirty="0" smtClean="0"/>
+              <a:t> MVC</a:t>
+            </a:r>
+          </a:p>
+          <a:p>
+            <a:endParaRPr lang="en-US" baseline="0" dirty="0" smtClean="0"/>
+          </a:p>
+          <a:p>
+            <a:r>
+              <a:rPr lang="en-US" baseline="0" dirty="0" smtClean="0"/>
+              <a:t>We built our </a:t>
+            </a:r>
+            <a:r>
+              <a:rPr lang="en-US" baseline="0" dirty="0" err="1" smtClean="0"/>
+              <a:t>Asp.Net</a:t>
+            </a:r>
+            <a:r>
+              <a:rPr lang="en-US" baseline="0" dirty="0" smtClean="0"/>
+              <a:t> MVC template project which we will use as our base project during this course</a:t>
+            </a:r>
+          </a:p>
+          <a:p>
+            <a:endParaRPr lang="en-US" baseline="0" dirty="0" smtClean="0"/>
+          </a:p>
+          <a:p>
+            <a:r>
+              <a:rPr lang="en-US" baseline="0" dirty="0" smtClean="0"/>
+              <a:t>We built a very simple hello world application to demonstrate how to use some of the tools we will be learning about during this course</a:t>
+            </a:r>
+          </a:p>
+          <a:p>
+            <a:endParaRPr lang="en-US" baseline="0" dirty="0" smtClean="0"/>
+          </a:p>
+          <a:p>
+            <a:r>
+              <a:rPr lang="en-US" baseline="0" dirty="0" smtClean="0"/>
+              <a:t>We ended up by reviewing our reference Silverlight application we are going to be porting over to html in order to better understand our objectives for the course</a:t>
+            </a:r>
+          </a:p>
+          <a:p>
+            <a:endParaRPr lang="en-US" baseline="0" dirty="0" smtClean="0"/>
+          </a:p>
+          <a:p>
+            <a:r>
+              <a:rPr lang="en-US" baseline="0" dirty="0" smtClean="0"/>
+              <a:t>In the next module we will dive straight in and start the actual port of our reference application to html</a:t>
+            </a:r>
+            <a:endParaRPr lang="en-US" dirty="0"/>
+          </a:p>
+        </p:txBody>
+      </p:sp>
+      <p:sp>
+        <p:nvSpPr>
+          <p:cNvPr id="4" name="Slide Number Placeholder 3"/>
+          <p:cNvSpPr>
+            <a:spLocks noGrp="1"/>
+          </p:cNvSpPr>
+          <p:nvPr>
+            <p:ph type="sldNum" sz="quarter" idx="10"/>
+          </p:nvPr>
+        </p:nvSpPr>
+        <p:spPr/>
+        <p:txBody>
+          <a:bodyPr/>
+          <a:lstStyle/>
+          <a:p>
+            <a:pPr>
+              <a:defRPr/>
+            </a:pPr>
+            <a:fld id="{47C584BF-6945-4E60-B2A7-1638FF8EA8EE}" type="slidenum">
+              <a:rPr lang="en-US" smtClean="0"/>
+              <a:pPr>
+                <a:defRPr/>
+              </a:pPr>
+              <a:t>8</a:t>
             </a:fld>
             <a:endParaRPr lang="en-US"/>
           </a:p>
@@ -4267,6 +4331,30 @@
           <a:chExt cx="0" cy="0"/>
         </a:xfrm>
       </p:grpSpPr>
+      <p:pic>
+        <p:nvPicPr>
+          <p:cNvPr id="9" name="Picture 8"/>
+          <p:cNvPicPr>
+            <a:picLocks noChangeAspect="1"/>
+          </p:cNvPicPr>
+          <p:nvPr/>
+        </p:nvPicPr>
+        <p:blipFill>
+          <a:blip r:embed="rId3"/>
+          <a:stretch>
+            <a:fillRect/>
+          </a:stretch>
+        </p:blipFill>
+        <p:spPr>
+          <a:xfrm>
+            <a:off x="685800" y="1852930"/>
+            <a:ext cx="6877050" cy="1800225"/>
+          </a:xfrm>
+          <a:prstGeom prst="rect">
+            <a:avLst/>
+          </a:prstGeom>
+        </p:spPr>
+      </p:pic>
       <p:sp>
         <p:nvSpPr>
           <p:cNvPr id="2" name="Title 1"/>
@@ -4284,7 +4372,15 @@
           <a:p>
             <a:r>
               <a:rPr lang="en-US" dirty="0" smtClean="0"/>
-              <a:t>Leveraging your XAML Skills – Data Context		</a:t>
+              <a:t>Handling Click Binding – </a:t>
+            </a:r>
+            <a:r>
+              <a:rPr lang="en-US" dirty="0" err="1" smtClean="0"/>
+              <a:t>Xaml</a:t>
+            </a:r>
+            <a:r>
+              <a:rPr lang="en-US" dirty="0" smtClean="0"/>
+              <a:t> Way</a:t>
             </a:r>
             <a:endParaRPr lang="en-GB" dirty="0"/>
           </a:p>
@@ -4315,45 +4411,15 @@
             </a:pPr>
             <a:r>
               <a:rPr lang="en-GB" sz="1400" dirty="0" smtClean="0"/>
-              <a:t>XAML Way</a:t>
-            </a:r>
-            <a:endParaRPr lang="en-GB" sz="1400" dirty="0"/>
-          </a:p>
-          <a:p>
-            <a:pPr marL="0" indent="0">
-              <a:buNone/>
-            </a:pPr>
+              <a:t>Relay Command</a:t>
+            </a:r>
             <a:endParaRPr lang="en-GB" sz="1400" dirty="0"/>
           </a:p>
         </p:txBody>
       </p:sp>
       <p:pic>
         <p:nvPicPr>
-          <p:cNvPr id="5" name="Picture 4"/>
-          <p:cNvPicPr>
-            <a:picLocks noChangeAspect="1"/>
-          </p:cNvPicPr>
-          <p:nvPr/>
-        </p:nvPicPr>
-        <p:blipFill>
-          <a:blip r:embed="rId3"/>
-          <a:stretch>
-            <a:fillRect/>
-          </a:stretch>
-        </p:blipFill>
-        <p:spPr>
-          <a:xfrm>
-            <a:off x="533400" y="1752600"/>
-            <a:ext cx="4572000" cy="1719276"/>
-          </a:xfrm>
-          <a:prstGeom prst="rect">
-            <a:avLst/>
-          </a:prstGeom>
-        </p:spPr>
-      </p:pic>
-      <p:pic>
-        <p:nvPicPr>
-          <p:cNvPr id="6" name="Picture 5"/>
+          <p:cNvPr id="4" name="Picture 3"/>
           <p:cNvPicPr>
             <a:picLocks noChangeAspect="1"/>
           </p:cNvPicPr>
@@ -4367,8 +4433,8 @@
         </p:blipFill>
         <p:spPr>
           <a:xfrm>
-            <a:off x="442784" y="4114800"/>
-            <a:ext cx="4903138" cy="2238389"/>
+            <a:off x="680720" y="4343400"/>
+            <a:ext cx="4572000" cy="647700"/>
           </a:xfrm>
           <a:prstGeom prst="rect">
             <a:avLst/>
@@ -4377,7 +4443,7 @@
       </p:pic>
       <p:sp>
         <p:nvSpPr>
-          <p:cNvPr id="7" name="Text Placeholder 2"/>
+          <p:cNvPr id="20" name="Text Placeholder 2"/>
           <p:cNvSpPr txBox="1">
             <a:spLocks/>
           </p:cNvSpPr>
@@ -4385,7 +4451,7 @@
         </p:nvSpPr>
         <p:spPr bwMode="auto">
           <a:xfrm>
-            <a:off x="442784" y="3733800"/>
+            <a:off x="457200" y="3886200"/>
             <a:ext cx="8229600" cy="381000"/>
           </a:xfrm>
           <a:prstGeom prst="rect">
@@ -4601,36 +4667,22 @@
             </a:pPr>
             <a:r>
               <a:rPr lang="en-GB" sz="1400" kern="0" dirty="0" smtClean="0"/>
-              <a:t>HTML/Knockout </a:t>
-            </a:r>
-            <a:r>
-              <a:rPr lang="en-GB" sz="1400" kern="0" dirty="0" err="1" smtClean="0"/>
-              <a:t>js</a:t>
-            </a:r>
-            <a:r>
-              <a:rPr lang="en-GB" sz="1400" kern="0" dirty="0" smtClean="0"/>
-              <a:t> Way</a:t>
-            </a:r>
-          </a:p>
-          <a:p>
-            <a:pPr marL="0" indent="0">
-              <a:buFont typeface="Wingdings" pitchFamily="2" charset="2"/>
-              <a:buNone/>
-            </a:pPr>
+              <a:t>Command Binding</a:t>
+            </a:r>
             <a:endParaRPr lang="en-GB" sz="1400" kern="0" dirty="0"/>
           </a:p>
         </p:txBody>
       </p:sp>
       <p:cxnSp>
         <p:nvCxnSpPr>
-          <p:cNvPr id="10" name="Straight Arrow Connector 9"/>
+          <p:cNvPr id="23" name="Straight Arrow Connector 22"/>
           <p:cNvCxnSpPr/>
           <p:nvPr/>
         </p:nvCxnSpPr>
         <p:spPr bwMode="auto">
           <a:xfrm flipH="1">
-            <a:off x="2399270" y="1676400"/>
-            <a:ext cx="3620530" cy="173838"/>
+            <a:off x="4343400" y="1676400"/>
+            <a:ext cx="1676400" cy="304800"/>
           </a:xfrm>
           <a:prstGeom prst="straightConnector1">
             <a:avLst/>
@@ -4660,14 +4712,14 @@
       </p:cxnSp>
       <p:sp>
         <p:nvSpPr>
-          <p:cNvPr id="12" name="TextBox 11"/>
+          <p:cNvPr id="24" name="TextBox 23"/>
           <p:cNvSpPr txBox="1"/>
           <p:nvPr/>
         </p:nvSpPr>
         <p:spPr bwMode="auto">
           <a:xfrm>
-            <a:off x="6070417" y="1459468"/>
-            <a:ext cx="2446311" cy="369332"/>
+            <a:off x="6070417" y="1334869"/>
+            <a:ext cx="2446311" cy="646331"/>
           </a:xfrm>
           <a:prstGeom prst="rect">
             <a:avLst/>
@@ -4681,32 +4733,130 @@
           </a:ln>
         </p:spPr>
         <p:txBody>
-          <a:bodyPr wrap="none" rtlCol="0">
+          <a:bodyPr wrap="square" rtlCol="0">
             <a:spAutoFit/>
           </a:bodyPr>
           <a:lstStyle/>
           <a:p>
             <a:r>
-              <a:rPr lang="en-US" sz="1800" dirty="0" smtClean="0">
-                <a:latin typeface="+mj-lt"/>
+              <a:rPr lang="en-US" dirty="0" smtClean="0">
+                <a:solidFill>
+                  <a:prstClr val="black"/>
+                </a:solidFill>
+                <a:latin typeface="Myriad Pro"/>
               </a:rPr>
-              <a:t>Constructor of the View</a:t>
-            </a:r>
-            <a:endParaRPr lang="en-US" sz="1800" dirty="0">
-              <a:latin typeface="+mj-lt"/>
+              <a:t>Bound property implements </a:t>
+            </a:r>
+            <a:r>
+              <a:rPr lang="en-US" dirty="0" err="1" smtClean="0">
+                <a:solidFill>
+                  <a:prstClr val="black"/>
+                </a:solidFill>
+                <a:latin typeface="Myriad Pro"/>
+              </a:rPr>
+              <a:t>ICommand</a:t>
+            </a:r>
+            <a:endParaRPr lang="en-US" dirty="0">
+              <a:solidFill>
+                <a:prstClr val="black"/>
+              </a:solidFill>
+              <a:latin typeface="Myriad Pro"/>
             </a:endParaRPr>
           </a:p>
         </p:txBody>
       </p:sp>
       <p:cxnSp>
         <p:nvCxnSpPr>
-          <p:cNvPr id="15" name="Straight Arrow Connector 14"/>
+          <p:cNvPr id="25" name="Straight Arrow Connector 24"/>
+          <p:cNvCxnSpPr/>
+          <p:nvPr/>
+        </p:nvCxnSpPr>
+        <p:spPr bwMode="auto">
+          <a:xfrm flipV="1">
+            <a:off x="6055177" y="3129964"/>
+            <a:ext cx="0" cy="433070"/>
+          </a:xfrm>
+          <a:prstGeom prst="straightConnector1">
+            <a:avLst/>
+          </a:prstGeom>
+          <a:ln w="63500">
+            <a:solidFill>
+              <a:schemeClr val="tx1"/>
+            </a:solidFill>
+            <a:headEnd type="none" w="med" len="med"/>
+            <a:tailEnd type="triangle"/>
+          </a:ln>
+        </p:spPr>
+        <p:style>
+          <a:lnRef idx="1">
+            <a:schemeClr val="accent2"/>
+          </a:lnRef>
+          <a:fillRef idx="0">
+            <a:schemeClr val="accent2"/>
+          </a:fillRef>
+          <a:effectRef idx="0">
+            <a:schemeClr val="accent2"/>
+          </a:effectRef>
+          <a:fontRef idx="minor">
+            <a:schemeClr val="tx1"/>
+          </a:fontRef>
+        </p:style>
+      </p:cxnSp>
+      <p:sp>
+        <p:nvSpPr>
+          <p:cNvPr id="26" name="TextBox 25"/>
+          <p:cNvSpPr txBox="1"/>
+          <p:nvPr/>
+        </p:nvSpPr>
+        <p:spPr bwMode="auto">
+          <a:xfrm>
+            <a:off x="5080979" y="3563034"/>
+            <a:ext cx="2446311" cy="646331"/>
+          </a:xfrm>
+          <a:prstGeom prst="rect">
+            <a:avLst/>
+          </a:prstGeom>
+          <a:noFill/>
+          <a:ln w="9525">
+            <a:noFill/>
+            <a:miter lim="800000"/>
+            <a:headEnd/>
+            <a:tailEnd/>
+          </a:ln>
+        </p:spPr>
+        <p:txBody>
+          <a:bodyPr wrap="square" rtlCol="0">
+            <a:spAutoFit/>
+          </a:bodyPr>
+          <a:lstStyle/>
+          <a:p>
+            <a:r>
+              <a:rPr lang="en-US" dirty="0" smtClean="0">
+                <a:solidFill>
+                  <a:prstClr val="black"/>
+                </a:solidFill>
+                <a:latin typeface="Myriad Pro"/>
+              </a:rPr>
+              <a:t>Provide methods to handle click action</a:t>
+            </a:r>
+            <a:endParaRPr lang="en-US" dirty="0">
+              <a:solidFill>
+                <a:prstClr val="black"/>
+              </a:solidFill>
+              <a:latin typeface="Myriad Pro"/>
+            </a:endParaRPr>
+          </a:p>
+        </p:txBody>
+      </p:sp>
+      <p:cxnSp>
+        <p:nvCxnSpPr>
+          <p:cNvPr id="27" name="Straight Arrow Connector 26"/>
           <p:cNvCxnSpPr/>
           <p:nvPr/>
         </p:nvCxnSpPr>
         <p:spPr bwMode="auto">
           <a:xfrm flipH="1">
-            <a:off x="5029200" y="2895600"/>
+            <a:off x="5029200" y="4636532"/>
             <a:ext cx="990600" cy="76200"/>
           </a:xfrm>
           <a:prstGeom prst="straightConnector1">
@@ -4737,14 +4887,14 @@
       </p:cxnSp>
       <p:sp>
         <p:nvSpPr>
-          <p:cNvPr id="17" name="TextBox 16"/>
+          <p:cNvPr id="28" name="TextBox 27"/>
           <p:cNvSpPr txBox="1"/>
           <p:nvPr/>
         </p:nvSpPr>
         <p:spPr bwMode="auto">
           <a:xfrm>
-            <a:off x="6070416" y="2630269"/>
-            <a:ext cx="2734210" cy="646331"/>
+            <a:off x="6070417" y="4419600"/>
+            <a:ext cx="2446311" cy="646331"/>
           </a:xfrm>
           <a:prstGeom prst="rect">
             <a:avLst/>
@@ -4758,251 +4908,47 @@
           </a:ln>
         </p:spPr>
         <p:txBody>
-          <a:bodyPr wrap="none" rtlCol="0">
+          <a:bodyPr wrap="square" rtlCol="0">
             <a:spAutoFit/>
           </a:bodyPr>
           <a:lstStyle/>
           <a:p>
             <a:r>
               <a:rPr lang="en-US" dirty="0" smtClean="0">
-                <a:latin typeface="+mj-lt"/>
+                <a:solidFill>
+                  <a:prstClr val="black"/>
+                </a:solidFill>
+                <a:latin typeface="Myriad Pro"/>
               </a:rPr>
-              <a:t>Bind the </a:t>
+              <a:t>Bind to our </a:t>
             </a:r>
             <a:r>
               <a:rPr lang="en-US" dirty="0" err="1" smtClean="0">
-                <a:latin typeface="+mj-lt"/>
+                <a:solidFill>
+                  <a:prstClr val="black"/>
+                </a:solidFill>
+                <a:latin typeface="Myriad Pro"/>
               </a:rPr>
-              <a:t>ViewModel</a:t>
+              <a:t>ICommand</a:t>
             </a:r>
             <a:r>
               <a:rPr lang="en-US" dirty="0" smtClean="0">
-                <a:latin typeface="+mj-lt"/>
+                <a:solidFill>
+                  <a:prstClr val="black"/>
+                </a:solidFill>
+                <a:latin typeface="Myriad Pro"/>
               </a:rPr>
-              <a:t> to the</a:t>
-            </a:r>
-          </a:p>
-          <a:p>
-            <a:r>
-              <a:rPr lang="en-US" sz="1800" dirty="0" smtClean="0">
-                <a:latin typeface="+mj-lt"/>
-              </a:rPr>
-              <a:t>Data Context</a:t>
-            </a:r>
-            <a:endParaRPr lang="en-US" sz="1800" dirty="0">
-              <a:latin typeface="+mj-lt"/>
+              <a:t> in the View Model</a:t>
+            </a:r>
+            <a:endParaRPr lang="en-US" dirty="0">
+              <a:solidFill>
+                <a:prstClr val="black"/>
+              </a:solidFill>
+              <a:latin typeface="Myriad Pro"/>
             </a:endParaRPr>
           </a:p>
         </p:txBody>
       </p:sp>
-      <p:cxnSp>
-        <p:nvCxnSpPr>
-          <p:cNvPr id="18" name="Straight Arrow Connector 17"/>
-          <p:cNvCxnSpPr/>
-          <p:nvPr/>
-        </p:nvCxnSpPr>
-        <p:spPr bwMode="auto">
-          <a:xfrm flipH="1">
-            <a:off x="4267200" y="4191000"/>
-            <a:ext cx="1752600" cy="140732"/>
-          </a:xfrm>
-          <a:prstGeom prst="straightConnector1">
-            <a:avLst/>
-          </a:prstGeom>
-          <a:ln w="63500">
-            <a:solidFill>
-              <a:schemeClr val="tx1"/>
-            </a:solidFill>
-            <a:headEnd type="none" w="med" len="med"/>
-            <a:tailEnd type="triangle"/>
-          </a:ln>
-        </p:spPr>
-        <p:style>
-          <a:lnRef idx="1">
-            <a:schemeClr val="accent2"/>
-          </a:lnRef>
-          <a:fillRef idx="0">
-            <a:schemeClr val="accent2"/>
-          </a:fillRef>
-          <a:effectRef idx="0">
-            <a:schemeClr val="accent2"/>
-          </a:effectRef>
-          <a:fontRef idx="minor">
-            <a:schemeClr val="tx1"/>
-          </a:fontRef>
-        </p:style>
-      </p:cxnSp>
-      <p:sp>
-        <p:nvSpPr>
-          <p:cNvPr id="19" name="TextBox 18"/>
-          <p:cNvSpPr txBox="1"/>
-          <p:nvPr/>
-        </p:nvSpPr>
-        <p:spPr bwMode="auto">
-          <a:xfrm>
-            <a:off x="6070417" y="3962400"/>
-            <a:ext cx="2427139" cy="369332"/>
-          </a:xfrm>
-          <a:prstGeom prst="rect">
-            <a:avLst/>
-          </a:prstGeom>
-          <a:noFill/>
-          <a:ln w="9525">
-            <a:noFill/>
-            <a:miter lim="800000"/>
-            <a:headEnd/>
-            <a:tailEnd/>
-          </a:ln>
-        </p:spPr>
-        <p:txBody>
-          <a:bodyPr wrap="none" rtlCol="0">
-            <a:spAutoFit/>
-          </a:bodyPr>
-          <a:lstStyle/>
-          <a:p>
-            <a:r>
-              <a:rPr lang="en-US" sz="1800" dirty="0" smtClean="0">
-                <a:latin typeface="+mj-lt"/>
-              </a:rPr>
-              <a:t>Script block in the View</a:t>
-            </a:r>
-            <a:endParaRPr lang="en-US" sz="1800" dirty="0">
-              <a:latin typeface="+mj-lt"/>
-            </a:endParaRPr>
-          </a:p>
-        </p:txBody>
-      </p:sp>
-      <p:cxnSp>
-        <p:nvCxnSpPr>
-          <p:cNvPr id="21" name="Straight Arrow Connector 20"/>
-          <p:cNvCxnSpPr/>
-          <p:nvPr/>
-        </p:nvCxnSpPr>
-        <p:spPr bwMode="auto">
-          <a:xfrm flipH="1">
-            <a:off x="3886200" y="5105400"/>
-            <a:ext cx="2133600" cy="178716"/>
-          </a:xfrm>
-          <a:prstGeom prst="straightConnector1">
-            <a:avLst/>
-          </a:prstGeom>
-          <a:ln w="63500">
-            <a:solidFill>
-              <a:schemeClr val="tx1"/>
-            </a:solidFill>
-            <a:headEnd type="none" w="med" len="med"/>
-            <a:tailEnd type="triangle"/>
-          </a:ln>
-        </p:spPr>
-        <p:style>
-          <a:lnRef idx="1">
-            <a:schemeClr val="accent2"/>
-          </a:lnRef>
-          <a:fillRef idx="0">
-            <a:schemeClr val="accent2"/>
-          </a:fillRef>
-          <a:effectRef idx="0">
-            <a:schemeClr val="accent2"/>
-          </a:effectRef>
-          <a:fontRef idx="minor">
-            <a:schemeClr val="tx1"/>
-          </a:fontRef>
-        </p:style>
-      </p:cxnSp>
-      <p:sp>
-        <p:nvSpPr>
-          <p:cNvPr id="22" name="TextBox 21"/>
-          <p:cNvSpPr txBox="1"/>
-          <p:nvPr/>
-        </p:nvSpPr>
-        <p:spPr bwMode="auto">
-          <a:xfrm>
-            <a:off x="6066297" y="4876800"/>
-            <a:ext cx="2734210" cy="646331"/>
-          </a:xfrm>
-          <a:prstGeom prst="rect">
-            <a:avLst/>
-          </a:prstGeom>
-          <a:noFill/>
-          <a:ln w="9525">
-            <a:noFill/>
-            <a:miter lim="800000"/>
-            <a:headEnd/>
-            <a:tailEnd/>
-          </a:ln>
-        </p:spPr>
-        <p:txBody>
-          <a:bodyPr wrap="none" rtlCol="0">
-            <a:spAutoFit/>
-          </a:bodyPr>
-          <a:lstStyle/>
-          <a:p>
-            <a:r>
-              <a:rPr lang="en-US" dirty="0" smtClean="0">
-                <a:latin typeface="+mj-lt"/>
-              </a:rPr>
-              <a:t>Bind the </a:t>
-            </a:r>
-            <a:r>
-              <a:rPr lang="en-US" dirty="0" err="1" smtClean="0">
-                <a:latin typeface="+mj-lt"/>
-              </a:rPr>
-              <a:t>ViewModel</a:t>
-            </a:r>
-            <a:r>
-              <a:rPr lang="en-US" dirty="0" smtClean="0">
-                <a:latin typeface="+mj-lt"/>
-              </a:rPr>
-              <a:t> to the</a:t>
-            </a:r>
-          </a:p>
-          <a:p>
-            <a:r>
-              <a:rPr lang="en-US" dirty="0" smtClean="0">
-                <a:latin typeface="+mj-lt"/>
-              </a:rPr>
-              <a:t>View via Knockout.js</a:t>
-            </a:r>
-            <a:endParaRPr lang="en-US" sz="1800" dirty="0">
-              <a:latin typeface="+mj-lt"/>
-            </a:endParaRPr>
-          </a:p>
-        </p:txBody>
-      </p:sp>
-      <p:cxnSp>
-        <p:nvCxnSpPr>
-          <p:cNvPr id="8" name="Straight Connector 7"/>
-          <p:cNvCxnSpPr/>
-          <p:nvPr/>
-        </p:nvCxnSpPr>
-        <p:spPr bwMode="auto">
-          <a:xfrm>
-            <a:off x="990600" y="4770120"/>
-            <a:ext cx="1408670" cy="0"/>
-          </a:xfrm>
-          <a:prstGeom prst="line">
-            <a:avLst/>
-          </a:prstGeom>
-          <a:ln>
-            <a:headEnd type="none" w="med" len="med"/>
-            <a:tailEnd type="none" w="med" len="med"/>
-          </a:ln>
-        </p:spPr>
-        <p:style>
-          <a:lnRef idx="2">
-            <a:schemeClr val="accent2"/>
-          </a:lnRef>
-          <a:fillRef idx="0">
-            <a:schemeClr val="accent2"/>
-          </a:fillRef>
-          <a:effectRef idx="1">
-            <a:schemeClr val="accent2"/>
-          </a:effectRef>
-          <a:fontRef idx="minor">
-            <a:schemeClr val="tx1"/>
-          </a:fontRef>
-        </p:style>
-      </p:cxnSp>
     </p:spTree>
     <p:extLst>
       <p:ext uri="{BB962C8B-B14F-4D97-AF65-F5344CB8AC3E}">
@@ -5028,6 +4974,9 @@
                     <p:cTn id="3" fill="hold">
                       <p:stCondLst>
                         <p:cond delay="indefinite"/>
+                        <p:cond evt="onBegin" delay="0">
+                          <p:tn val="2"/>
+                        </p:cond>
                       </p:stCondLst>
                       <p:childTnLst>
                         <p:par>
@@ -5037,7 +4986,7 @@
                             </p:stCondLst>
                             <p:childTnLst>
                               <p:par>
-                                <p:cTn id="5" presetID="1" presetClass="entr" presetSubtype="0" fill="hold" grpId="0" nodeType="clickEffect">
+                                <p:cTn id="5" presetID="1" presetClass="entr" presetSubtype="0" fill="hold" nodeType="withEffect">
                                   <p:stCondLst>
                                     <p:cond delay="0"/>
                                   </p:stCondLst>
@@ -5050,11 +4999,7 @@
                                           </p:stCondLst>
                                         </p:cTn>
                                         <p:tgtEl>
-                                          <p:spTgt spid="3">
-                                            <p:txEl>
-                                              <p:pRg st="0" end="0"/>
-                                            </p:txEl>
-                                          </p:spTgt>
+                                          <p:spTgt spid="9"/>
                                         </p:tgtEl>
                                         <p:attrNameLst>
                                           <p:attrName>style.visibility</p:attrName>
@@ -5068,7 +5013,7 @@
                                 </p:cTn>
                               </p:par>
                               <p:par>
-                                <p:cTn id="7" presetID="1" presetClass="entr" presetSubtype="0" fill="hold" nodeType="withEffect">
+                                <p:cTn id="7" presetID="1" presetClass="entr" presetSubtype="0" fill="hold" grpId="0" nodeType="withEffect">
                                   <p:stCondLst>
                                     <p:cond delay="0"/>
                                   </p:stCondLst>
@@ -5081,7 +5026,11 @@
                                           </p:stCondLst>
                                         </p:cTn>
                                         <p:tgtEl>
-                                          <p:spTgt spid="5"/>
+                                          <p:spTgt spid="3">
+                                            <p:txEl>
+                                              <p:pRg st="0" end="0"/>
+                                            </p:txEl>
+                                          </p:spTgt>
                                         </p:tgtEl>
                                         <p:attrNameLst>
                                           <p:attrName>style.visibility</p:attrName>
@@ -5113,7 +5062,7 @@
                             </p:stCondLst>
                             <p:childTnLst>
                               <p:par>
-                                <p:cTn id="11" presetID="1" presetClass="entr" presetSubtype="0" fill="hold" nodeType="clickEffect">
+                                <p:cTn id="11" presetID="1" presetClass="entr" presetSubtype="0" fill="hold" grpId="0" nodeType="clickEffect">
                                   <p:stCondLst>
                                     <p:cond delay="0"/>
                                   </p:stCondLst>
@@ -5126,7 +5075,7 @@
                                           </p:stCondLst>
                                         </p:cTn>
                                         <p:tgtEl>
-                                          <p:spTgt spid="10"/>
+                                          <p:spTgt spid="24"/>
                                         </p:tgtEl>
                                         <p:attrNameLst>
                                           <p:attrName>style.visibility</p:attrName>
@@ -5140,7 +5089,7 @@
                                 </p:cTn>
                               </p:par>
                               <p:par>
-                                <p:cTn id="13" presetID="1" presetClass="entr" presetSubtype="0" fill="hold" grpId="0" nodeType="withEffect">
+                                <p:cTn id="13" presetID="1" presetClass="entr" presetSubtype="0" fill="hold" nodeType="withEffect">
                                   <p:stCondLst>
                                     <p:cond delay="0"/>
                                   </p:stCondLst>
@@ -5153,7 +5102,7 @@
                                           </p:stCondLst>
                                         </p:cTn>
                                         <p:tgtEl>
-                                          <p:spTgt spid="12"/>
+                                          <p:spTgt spid="23"/>
                                         </p:tgtEl>
                                         <p:attrNameLst>
                                           <p:attrName>style.visibility</p:attrName>
@@ -5185,7 +5134,7 @@
                             </p:stCondLst>
                             <p:childTnLst>
                               <p:par>
-                                <p:cTn id="17" presetID="1" presetClass="entr" presetSubtype="0" fill="hold" nodeType="clickEffect">
+                                <p:cTn id="17" presetID="1" presetClass="entr" presetSubtype="0" fill="hold" grpId="0" nodeType="clickEffect">
                                   <p:stCondLst>
                                     <p:cond delay="0"/>
                                   </p:stCondLst>
@@ -5198,7 +5147,7 @@
                                           </p:stCondLst>
                                         </p:cTn>
                                         <p:tgtEl>
-                                          <p:spTgt spid="15"/>
+                                          <p:spTgt spid="26"/>
                                         </p:tgtEl>
                                         <p:attrNameLst>
                                           <p:attrName>style.visibility</p:attrName>
@@ -5212,7 +5161,7 @@
                                 </p:cTn>
                               </p:par>
                               <p:par>
-                                <p:cTn id="19" presetID="1" presetClass="entr" presetSubtype="0" fill="hold" grpId="0" nodeType="withEffect">
+                                <p:cTn id="19" presetID="1" presetClass="entr" presetSubtype="0" fill="hold" nodeType="withEffect">
                                   <p:stCondLst>
                                     <p:cond delay="0"/>
                                   </p:stCondLst>
@@ -5225,52 +5174,7 @@
                                           </p:stCondLst>
                                         </p:cTn>
                                         <p:tgtEl>
-                                          <p:spTgt spid="17"/>
-                                        </p:tgtEl>
-                                        <p:attrNameLst>
-                                          <p:attrName>style.visibility</p:attrName>
-                                        </p:attrNameLst>
-                                      </p:cBhvr>
-                                      <p:to>
-                                        <p:strVal val="visible"/>
-                                      </p:to>
-                                    </p:set>
-                                  </p:childTnLst>
-                                </p:cTn>
-                              </p:par>
-                            </p:childTnLst>
-                          </p:cTn>
-                        </p:par>
-                      </p:childTnLst>
-                    </p:cTn>
-                  </p:par>
-                  <p:par>
-                    <p:cTn id="21" fill="hold">
-                      <p:stCondLst>
-                        <p:cond delay="indefinite"/>
-                      </p:stCondLst>
-                      <p:childTnLst>
-                        <p:par>
-                          <p:cTn id="22" fill="hold">
-                            <p:stCondLst>
-                              <p:cond delay="0"/>
-                            </p:stCondLst>
-                            <p:childTnLst>
-                              <p:par>
-                                <p:cTn id="23" presetID="1" presetClass="entr" presetSubtype="0" fill="hold" grpId="0" nodeType="clickEffect">
-                                  <p:stCondLst>
-                                    <p:cond delay="0"/>
-                                  </p:stCondLst>
-                                  <p:childTnLst>
-                                    <p:set>
-                                      <p:cBhvr>
-                                        <p:cTn id="24" dur="1" fill="hold">
-                                          <p:stCondLst>
-                                            <p:cond delay="0"/>
-                                          </p:stCondLst>
-                                        </p:cTn>
-                                        <p:tgtEl>
-                                          <p:spTgt spid="7"/>
+                                          <p:spTgt spid="25"/>
                                         </p:tgtEl>
                                         <p:attrNameLst>
                                           <p:attrName>style.visibility</p:attrName>
@@ -5284,27 +5188,70 @@
                                 </p:cTn>
                               </p:par>
                               <p:par>
-                                <p:cTn id="25" presetID="1" presetClass="entr" presetSubtype="0" fill="hold" nodeType="withEffect">
+                                <p:cTn id="21" presetID="10" presetClass="exit" presetSubtype="0" fill="hold" grpId="1" nodeType="withEffect">
                                   <p:stCondLst>
                                     <p:cond delay="0"/>
                                   </p:stCondLst>
                                   <p:childTnLst>
+                                    <p:animEffect transition="out" filter="fade">
+                                      <p:cBhvr>
+                                        <p:cTn id="22" dur="500"/>
+                                        <p:tgtEl>
+                                          <p:spTgt spid="24"/>
+                                        </p:tgtEl>
+                                      </p:cBhvr>
+                                    </p:animEffect>
                                     <p:set>
                                       <p:cBhvr>
-                                        <p:cTn id="26" dur="1" fill="hold">
+                                        <p:cTn id="23" dur="1" fill="hold">
                                           <p:stCondLst>
-                                            <p:cond delay="0"/>
+                                            <p:cond delay="499"/>
                                           </p:stCondLst>
                                         </p:cTn>
                                         <p:tgtEl>
-                                          <p:spTgt spid="6"/>
+                                          <p:spTgt spid="24"/>
                                         </p:tgtEl>
                                         <p:attrNameLst>
                                           <p:attrName>style.visibility</p:attrName>
                                         </p:attrNameLst>
                                       </p:cBhvr>
                                       <p:to>
-                                        <p:strVal val="visible"/>
+                                        <p:strVal val="hidden"/>
+                                      </p:to>
+                                    </p:set>
+                                  </p:childTnLst>
+                                </p:cTn>
+                              </p:par>
+                              <p:par>
+                                <p:cTn id="24" presetID="10" presetClass="exit" presetSubtype="0" fill="hold" nodeType="withEffect">
+                                  <p:stCondLst>
+                                    <p:cond delay="0"/>
+                                  </p:stCondLst>
+                                  <p:childTnLst>
+                                    <p:animEffect transition="out" filter="fade">
+                                      <p:cBhvr>
+                                        <p:cTn id="25" dur="500"/>
+                                        <p:tgtEl>
+                                          <p:spTgt spid="23"/>
+                                        </p:tgtEl>
+                                      </p:cBhvr>
+                                    </p:animEffect>
+                                    <p:set>
+                                      <p:cBhvr>
+                                        <p:cTn id="26" dur="1" fill="hold">
+                                          <p:stCondLst>
+                                            <p:cond delay="499"/>
+                                          </p:stCondLst>
+                                        </p:cTn>
+                                        <p:tgtEl>
+                                          <p:spTgt spid="23"/>
+                                        </p:tgtEl>
+                                        <p:attrNameLst>
+                                          <p:attrName>style.visibility</p:attrName>
+                                        </p:attrNameLst>
+                                      </p:cBhvr>
+                                      <p:to>
+                                        <p:strVal val="hidden"/>
                                       </p:to>
                                     </p:set>
                                   </p:childTnLst>
@@ -5342,7 +5289,7 @@
                                           </p:stCondLst>
                                         </p:cTn>
                                         <p:tgtEl>
-                                          <p:spTgt spid="19"/>
+                                          <p:spTgt spid="20"/>
                                         </p:tgtEl>
                                         <p:attrNameLst>
                                           <p:attrName>style.visibility</p:attrName>
@@ -5369,97 +5316,7 @@
                                           </p:stCondLst>
                                         </p:cTn>
                                         <p:tgtEl>
-                                          <p:spTgt spid="18"/>
-                                        </p:tgtEl>
-                                        <p:attrNameLst>
-                                          <p:attrName>style.visibility</p:attrName>
-                                        </p:attrNameLst>
-                                      </p:cBhvr>
-                                      <p:to>
-                                        <p:strVal val="visible"/>
-                                      </p:to>
-                                    </p:set>
-                                  </p:childTnLst>
-                                </p:cTn>
-                              </p:par>
-                            </p:childTnLst>
-                          </p:cTn>
-                        </p:par>
-                      </p:childTnLst>
-                    </p:cTn>
-                  </p:par>
-                  <p:par>
-                    <p:cTn id="33" fill="hold">
-                      <p:stCondLst>
-                        <p:cond delay="indefinite"/>
-                      </p:stCondLst>
-                      <p:childTnLst>
-                        <p:par>
-                          <p:cTn id="34" fill="hold">
-                            <p:stCondLst>
-                              <p:cond delay="0"/>
-                            </p:stCondLst>
-                            <p:childTnLst>
-                              <p:par>
-                                <p:cTn id="35" presetID="1" presetClass="entr" presetSubtype="0" fill="hold" nodeType="clickEffect">
-                                  <p:stCondLst>
-                                    <p:cond delay="0"/>
-                                  </p:stCondLst>
-                                  <p:childTnLst>
-                                    <p:set>
-                                      <p:cBhvr>
-                                        <p:cTn id="36" dur="1" fill="hold">
-                                          <p:stCondLst>
-                                            <p:cond delay="0"/>
-                                          </p:stCondLst>
-                                        </p:cTn>
-                                        <p:tgtEl>
-                                          <p:spTgt spid="8"/>
-                                        </p:tgtEl>
-                                        <p:attrNameLst>
-                                          <p:attrName>style.visibility</p:attrName>
-                                        </p:attrNameLst>
-                                      </p:cBhvr>
-                                      <p:to>
-                                        <p:strVal val="visible"/>
-                                      </p:to>
-                                    </p:set>
-                                  </p:childTnLst>
-                                </p:cTn>
-                              </p:par>
-                            </p:childTnLst>
-                          </p:cTn>
-                        </p:par>
-                      </p:childTnLst>
-                    </p:cTn>
-                  </p:par>
-                  <p:par>
-                    <p:cTn id="37" fill="hold">
-                      <p:stCondLst>
-                        <p:cond delay="indefinite"/>
-                      </p:stCondLst>
-                      <p:childTnLst>
-                        <p:par>
-                          <p:cTn id="38" fill="hold">
-                            <p:stCondLst>
-                              <p:cond delay="0"/>
-                            </p:stCondLst>
-                            <p:childTnLst>
-                              <p:par>
-                                <p:cTn id="39" presetID="1" presetClass="entr" presetSubtype="0" fill="hold" nodeType="clickEffect">
-                                  <p:stCondLst>
-                                    <p:cond delay="0"/>
-                                  </p:stCondLst>
-                                  <p:childTnLst>
-                                    <p:set>
-                                      <p:cBhvr>
-                                        <p:cTn id="40" dur="1" fill="hold">
-                                          <p:stCondLst>
-                                            <p:cond delay="0"/>
-                                          </p:stCondLst>
-                                        </p:cTn>
-                                        <p:tgtEl>
-                                          <p:spTgt spid="21"/>
+                                          <p:spTgt spid="4"/>
                                         </p:tgtEl>
                                         <p:attrNameLst>
                                           <p:attrName>style.visibility</p:attrName>
@@ -5473,7 +5330,95 @@
                                 </p:cTn>
                               </p:par>
                               <p:par>
-                                <p:cTn id="41" presetID="1" presetClass="entr" presetSubtype="0" fill="hold" grpId="0" nodeType="withEffect">
+                                <p:cTn id="33" presetID="10" presetClass="exit" presetSubtype="0" fill="hold" grpId="1" nodeType="withEffect">
+                                  <p:stCondLst>
+                                    <p:cond delay="0"/>
+                                  </p:stCondLst>
+                                  <p:childTnLst>
+                                    <p:animEffect transition="out" filter="fade">
+                                      <p:cBhvr>
+                                        <p:cTn id="34" dur="500"/>
+                                        <p:tgtEl>
+                                          <p:spTgt spid="26"/>
+                                        </p:tgtEl>
+                                      </p:cBhvr>
+                                    </p:animEffect>
+                                    <p:set>
+                                      <p:cBhvr>
+                                        <p:cTn id="35" dur="1" fill="hold">
+                                          <p:stCondLst>
+                                            <p:cond delay="499"/>
+                                          </p:stCondLst>
+                                        </p:cTn>
+                                        <p:tgtEl>
+                                          <p:spTgt spid="26"/>
+                                        </p:tgtEl>
+                                        <p:attrNameLst>
+                                          <p:attrName>style.visibility</p:attrName>
+                                        </p:attrNameLst>
+                                      </p:cBhvr>
+                                      <p:to>
+                                        <p:strVal val="hidden"/>
+                                      </p:to>
+                                    </p:set>
+                                  </p:childTnLst>
+                                </p:cTn>
+                              </p:par>
+                              <p:par>
+                                <p:cTn id="36" presetID="10" presetClass="exit" presetSubtype="0" fill="hold" nodeType="withEffect">
+                                  <p:stCondLst>
+                                    <p:cond delay="0"/>
+                                  </p:stCondLst>
+                                  <p:childTnLst>
+                                    <p:animEffect transition="out" filter="fade">
+                                      <p:cBhvr>
+                                        <p:cTn id="37" dur="500"/>
+                                        <p:tgtEl>
+                                          <p:spTgt spid="25"/>
+                                        </p:tgtEl>
+                                      </p:cBhvr>
+                                    </p:animEffect>
+                                    <p:set>
+                                      <p:cBhvr>
+                                        <p:cTn id="38" dur="1" fill="hold">
+                                          <p:stCondLst>
+                                            <p:cond delay="499"/>
+                                          </p:stCondLst>
+                                        </p:cTn>
+                                        <p:tgtEl>
+                                          <p:spTgt spid="25"/>
+                                        </p:tgtEl>
+                                        <p:attrNameLst>
+                                          <p:attrName>style.visibility</p:attrName>
+                                        </p:attrNameLst>
+                                      </p:cBhvr>
+                                      <p:to>
+                                        <p:strVal val="hidden"/>
+                                      </p:to>
+                                    </p:set>
+                                  </p:childTnLst>
+                                </p:cTn>
+                              </p:par>
+                            </p:childTnLst>
+                          </p:cTn>
+                        </p:par>
+                      </p:childTnLst>
+                    </p:cTn>
+                  </p:par>
+                  <p:par>
+                    <p:cTn id="39" fill="hold">
+                      <p:stCondLst>
+                        <p:cond delay="indefinite"/>
+                      </p:stCondLst>
+                      <p:childTnLst>
+                        <p:par>
+                          <p:cTn id="40" fill="hold">
+                            <p:stCondLst>
+                              <p:cond delay="0"/>
+                            </p:stCondLst>
+                            <p:childTnLst>
+                              <p:par>
+                                <p:cTn id="41" presetID="1" presetClass="entr" presetSubtype="0" fill="hold" grpId="0" nodeType="clickEffect">
                                   <p:stCondLst>
                                     <p:cond delay="0"/>
                                   </p:stCondLst>
@@ -5486,7 +5431,7 @@
                                           </p:stCondLst>
                                         </p:cTn>
                                         <p:tgtEl>
-                                          <p:spTgt spid="22"/>
+                                          <p:spTgt spid="28"/>
                                         </p:tgtEl>
                                         <p:attrNameLst>
                                           <p:attrName>style.visibility</p:attrName>
@@ -5500,7 +5445,7 @@
                                 </p:cTn>
                               </p:par>
                               <p:par>
-                                <p:cTn id="43" presetID="1" presetClass="exit" presetSubtype="0" fill="hold" nodeType="withEffect">
+                                <p:cTn id="43" presetID="1" presetClass="entr" presetSubtype="0" fill="hold" nodeType="withEffect">
                                   <p:stCondLst>
                                     <p:cond delay="0"/>
                                   </p:stCondLst>
@@ -5513,14 +5458,14 @@
                                           </p:stCondLst>
                                         </p:cTn>
                                         <p:tgtEl>
-                                          <p:spTgt spid="8"/>
+                                          <p:spTgt spid="27"/>
                                         </p:tgtEl>
                                         <p:attrNameLst>
                                           <p:attrName>style.visibility</p:attrName>
                                         </p:attrNameLst>
                                       </p:cBhvr>
                                       <p:to>
-                                        <p:strVal val="hidden"/>
+                                        <p:strVal val="visible"/>
                                       </p:to>
                                     </p:set>
                                   </p:childTnLst>
@@ -5555,17 +5500,1304 @@
     </p:tnLst>
     <p:bldLst>
       <p:bldP spid="3" grpId="0" build="p"/>
-      <p:bldP spid="7" grpId="0"/>
-      <p:bldP spid="12" grpId="0"/>
-      <p:bldP spid="17" grpId="0"/>
-      <p:bldP spid="19" grpId="0"/>
-      <p:bldP spid="22" grpId="0"/>
+      <p:bldP spid="20" grpId="0"/>
+      <p:bldP spid="24" grpId="0"/>
+      <p:bldP spid="24" grpId="1"/>
+      <p:bldP spid="26" grpId="0"/>
+      <p:bldP spid="26" grpId="1"/>
+      <p:bldP spid="28" grpId="0"/>
     </p:bldLst>
   </p:timing>
 </p:sld>
 </file>
 
 <file path=ppt/slides/slide6.xml><?xml version="1.0" encoding="utf-8"?>
+<p:sld xmlns:a="http://schemas.openxmlformats.org/drawingml/2006/main" xmlns:r="http://schemas.openxmlformats.org/officeDocument/2006/relationships" xmlns:p="http://schemas.openxmlformats.org/presentationml/2006/main">
+  <p:cSld>
+    <p:spTree>
+      <p:nvGrpSpPr>
+        <p:cNvPr id="1" name=""/>
+        <p:cNvGrpSpPr/>
+        <p:nvPr/>
+      </p:nvGrpSpPr>
+      <p:grpSpPr>
+        <a:xfrm>
+          <a:off x="0" y="0"/>
+          <a:ext cx="0" cy="0"/>
+          <a:chOff x="0" y="0"/>
+          <a:chExt cx="0" cy="0"/>
+        </a:xfrm>
+      </p:grpSpPr>
+      <p:pic>
+        <p:nvPicPr>
+          <p:cNvPr id="9" name="Picture 8"/>
+          <p:cNvPicPr>
+            <a:picLocks noChangeAspect="1"/>
+          </p:cNvPicPr>
+          <p:nvPr/>
+        </p:nvPicPr>
+        <p:blipFill>
+          <a:blip r:embed="rId3"/>
+          <a:stretch>
+            <a:fillRect/>
+          </a:stretch>
+        </p:blipFill>
+        <p:spPr>
+          <a:xfrm>
+            <a:off x="685800" y="1852930"/>
+            <a:ext cx="6877050" cy="1800225"/>
+          </a:xfrm>
+          <a:prstGeom prst="rect">
+            <a:avLst/>
+          </a:prstGeom>
+        </p:spPr>
+      </p:pic>
+      <p:sp>
+        <p:nvSpPr>
+          <p:cNvPr id="2" name="Title 1"/>
+          <p:cNvSpPr>
+            <a:spLocks noGrp="1"/>
+          </p:cNvSpPr>
+          <p:nvPr>
+            <p:ph type="title"/>
+          </p:nvPr>
+        </p:nvSpPr>
+        <p:spPr/>
+        <p:txBody>
+          <a:bodyPr/>
+          <a:lstStyle/>
+          <a:p>
+            <a:r>
+              <a:rPr lang="en-US" dirty="0" smtClean="0"/>
+              <a:t>Handling Click Binding – Knockout Way</a:t>
+            </a:r>
+            <a:endParaRPr lang="en-GB" dirty="0"/>
+          </a:p>
+        </p:txBody>
+      </p:sp>
+      <p:sp>
+        <p:nvSpPr>
+          <p:cNvPr id="3" name="Text Placeholder 2"/>
+          <p:cNvSpPr>
+            <a:spLocks noGrp="1"/>
+          </p:cNvSpPr>
+          <p:nvPr>
+            <p:ph type="body" idx="1"/>
+          </p:nvPr>
+        </p:nvSpPr>
+        <p:spPr>
+          <a:xfrm>
+            <a:off x="457200" y="1371600"/>
+            <a:ext cx="8229600" cy="381000"/>
+          </a:xfrm>
+        </p:spPr>
+        <p:txBody>
+          <a:bodyPr/>
+          <a:lstStyle/>
+          <a:p>
+            <a:pPr marL="0" indent="0">
+              <a:buNone/>
+            </a:pPr>
+            <a:r>
+              <a:rPr lang="en-GB" sz="1400" dirty="0" smtClean="0"/>
+              <a:t>Relay Command</a:t>
+            </a:r>
+            <a:endParaRPr lang="en-GB" sz="1400" dirty="0"/>
+          </a:p>
+        </p:txBody>
+      </p:sp>
+      <p:pic>
+        <p:nvPicPr>
+          <p:cNvPr id="4" name="Picture 3"/>
+          <p:cNvPicPr>
+            <a:picLocks noChangeAspect="1"/>
+          </p:cNvPicPr>
+          <p:nvPr/>
+        </p:nvPicPr>
+        <p:blipFill>
+          <a:blip r:embed="rId4"/>
+          <a:stretch>
+            <a:fillRect/>
+          </a:stretch>
+        </p:blipFill>
+        <p:spPr>
+          <a:xfrm>
+            <a:off x="680720" y="4343400"/>
+            <a:ext cx="4572000" cy="647700"/>
+          </a:xfrm>
+          <a:prstGeom prst="rect">
+            <a:avLst/>
+          </a:prstGeom>
+        </p:spPr>
+      </p:pic>
+      <p:sp>
+        <p:nvSpPr>
+          <p:cNvPr id="20" name="Text Placeholder 2"/>
+          <p:cNvSpPr txBox="1">
+            <a:spLocks/>
+          </p:cNvSpPr>
+          <p:nvPr/>
+        </p:nvSpPr>
+        <p:spPr bwMode="auto">
+          <a:xfrm>
+            <a:off x="457200" y="3886200"/>
+            <a:ext cx="8229600" cy="381000"/>
+          </a:xfrm>
+          <a:prstGeom prst="rect">
+            <a:avLst/>
+          </a:prstGeom>
+          <a:noFill/>
+          <a:ln w="9525">
+            <a:noFill/>
+            <a:miter lim="800000"/>
+            <a:headEnd/>
+            <a:tailEnd/>
+          </a:ln>
+        </p:spPr>
+        <p:txBody>
+          <a:bodyPr vert="horz" wrap="square" lIns="91440" tIns="45720" rIns="91440" bIns="45720" numCol="1" rtlCol="0" anchor="t" anchorCtr="0" compatLnSpc="1">
+            <a:prstTxWarp prst="textNoShape">
+              <a:avLst/>
+            </a:prstTxWarp>
+          </a:bodyPr>
+          <a:lstStyle>
+            <a:lvl1pPr marL="342900" indent="-342900" algn="l" defTabSz="-13873163" rtl="0" eaLnBrk="1" fontAlgn="base" hangingPunct="1">
+              <a:spcBef>
+                <a:spcPct val="20000"/>
+              </a:spcBef>
+              <a:spcAft>
+                <a:spcPct val="0"/>
+              </a:spcAft>
+              <a:buClrTx/>
+              <a:buFont typeface="Wingdings" pitchFamily="2" charset="2"/>
+              <a:buChar char="§"/>
+              <a:defRPr sz="2000" b="1">
+                <a:solidFill>
+                  <a:schemeClr val="tx1"/>
+                </a:solidFill>
+                <a:latin typeface="Myriad Pro Light" pitchFamily="34" charset="0"/>
+                <a:ea typeface="+mn-ea"/>
+                <a:cs typeface="Segoe UI" pitchFamily="34" charset="0"/>
+              </a:defRPr>
+            </a:lvl1pPr>
+            <a:lvl2pPr marL="742950" indent="-285750" algn="l" defTabSz="-13873163" rtl="0" eaLnBrk="1" fontAlgn="base" hangingPunct="1">
+              <a:spcBef>
+                <a:spcPct val="20000"/>
+              </a:spcBef>
+              <a:spcAft>
+                <a:spcPct val="0"/>
+              </a:spcAft>
+              <a:buClrTx/>
+              <a:buSzPct val="50000"/>
+              <a:buFont typeface="Wingdings" pitchFamily="2" charset="2"/>
+              <a:buChar char="o"/>
+              <a:defRPr sz="1800" b="0">
+                <a:solidFill>
+                  <a:schemeClr val="tx1"/>
+                </a:solidFill>
+                <a:latin typeface="Myriad Pro" pitchFamily="34" charset="0"/>
+                <a:cs typeface="Segoe UI" pitchFamily="34" charset="0"/>
+              </a:defRPr>
+            </a:lvl2pPr>
+            <a:lvl3pPr marL="1143000" indent="-228600" algn="l" defTabSz="-13873163" rtl="0" eaLnBrk="1" fontAlgn="base" hangingPunct="1">
+              <a:spcBef>
+                <a:spcPct val="20000"/>
+              </a:spcBef>
+              <a:spcAft>
+                <a:spcPct val="0"/>
+              </a:spcAft>
+              <a:buClrTx/>
+              <a:buSzPct val="50000"/>
+              <a:buFont typeface="Wingdings" pitchFamily="2" charset="2"/>
+              <a:buChar char="o"/>
+              <a:defRPr sz="1600" b="0">
+                <a:solidFill>
+                  <a:schemeClr val="tx1"/>
+                </a:solidFill>
+                <a:latin typeface="Myriad Pro" pitchFamily="34" charset="0"/>
+                <a:cs typeface="Segoe UI" pitchFamily="34" charset="0"/>
+              </a:defRPr>
+            </a:lvl3pPr>
+            <a:lvl4pPr marL="1600200" indent="-228600" algn="l" defTabSz="-13873163" rtl="0" eaLnBrk="1" fontAlgn="base" hangingPunct="1">
+              <a:spcBef>
+                <a:spcPct val="20000"/>
+              </a:spcBef>
+              <a:spcAft>
+                <a:spcPct val="0"/>
+              </a:spcAft>
+              <a:buClrTx/>
+              <a:buSzPct val="50000"/>
+              <a:buFont typeface="Wingdings" pitchFamily="2" charset="2"/>
+              <a:buChar char="o"/>
+              <a:defRPr sz="1400" b="0">
+                <a:solidFill>
+                  <a:schemeClr val="tx1"/>
+                </a:solidFill>
+                <a:latin typeface="Myriad Pro" pitchFamily="34" charset="0"/>
+                <a:cs typeface="Segoe UI" pitchFamily="34" charset="0"/>
+              </a:defRPr>
+            </a:lvl4pPr>
+            <a:lvl5pPr marL="2057400" indent="-228600" algn="l" defTabSz="-13873163" rtl="0" eaLnBrk="1" fontAlgn="base" hangingPunct="1">
+              <a:spcBef>
+                <a:spcPct val="20000"/>
+              </a:spcBef>
+              <a:spcAft>
+                <a:spcPct val="0"/>
+              </a:spcAft>
+              <a:buClrTx/>
+              <a:buSzPct val="50000"/>
+              <a:buFont typeface="Wingdings" pitchFamily="2" charset="2"/>
+              <a:buChar char="o"/>
+              <a:defRPr sz="1200" b="0">
+                <a:solidFill>
+                  <a:schemeClr val="tx1"/>
+                </a:solidFill>
+                <a:latin typeface="Myriad Pro" pitchFamily="34" charset="0"/>
+                <a:cs typeface="Segoe UI" pitchFamily="34" charset="0"/>
+              </a:defRPr>
+            </a:lvl5pPr>
+            <a:lvl6pPr marL="2514600" indent="-228600" algn="l" eaLnBrk="1" fontAlgn="base" hangingPunct="1">
+              <a:spcBef>
+                <a:spcPct val="20000"/>
+              </a:spcBef>
+              <a:spcAft>
+                <a:spcPct val="0"/>
+              </a:spcAft>
+              <a:buClr>
+                <a:schemeClr val="accent1">
+                  <a:alpha val="100000"/>
+                </a:schemeClr>
+              </a:buClr>
+              <a:buFont typeface="Wingdings"/>
+              <a:buChar char=""/>
+              <a:defRPr sz="1400" b="1">
+                <a:solidFill>
+                  <a:schemeClr val="tx1">
+                    <a:alpha val="100000"/>
+                  </a:schemeClr>
+                </a:solidFill>
+                <a:latin typeface="+mn-lt"/>
+              </a:defRPr>
+            </a:lvl6pPr>
+            <a:lvl7pPr marL="2971800" indent="-228600" algn="l" eaLnBrk="1" fontAlgn="base" hangingPunct="1">
+              <a:spcBef>
+                <a:spcPct val="20000"/>
+              </a:spcBef>
+              <a:spcAft>
+                <a:spcPct val="0"/>
+              </a:spcAft>
+              <a:buClr>
+                <a:schemeClr val="accent1">
+                  <a:alpha val="100000"/>
+                </a:schemeClr>
+              </a:buClr>
+              <a:buFont typeface="Wingdings"/>
+              <a:buChar char=""/>
+              <a:defRPr sz="1400" b="1">
+                <a:solidFill>
+                  <a:schemeClr val="tx1">
+                    <a:alpha val="100000"/>
+                  </a:schemeClr>
+                </a:solidFill>
+                <a:latin typeface="+mn-lt"/>
+              </a:defRPr>
+            </a:lvl7pPr>
+            <a:lvl8pPr marL="3429000" indent="-228600" algn="l" eaLnBrk="1" fontAlgn="base" hangingPunct="1">
+              <a:spcBef>
+                <a:spcPct val="20000"/>
+              </a:spcBef>
+              <a:spcAft>
+                <a:spcPct val="0"/>
+              </a:spcAft>
+              <a:buClr>
+                <a:schemeClr val="accent1">
+                  <a:alpha val="100000"/>
+                </a:schemeClr>
+              </a:buClr>
+              <a:buFont typeface="Wingdings"/>
+              <a:buChar char=""/>
+              <a:defRPr sz="1400" b="1">
+                <a:solidFill>
+                  <a:schemeClr val="tx1">
+                    <a:alpha val="100000"/>
+                  </a:schemeClr>
+                </a:solidFill>
+                <a:latin typeface="+mn-lt"/>
+              </a:defRPr>
+            </a:lvl8pPr>
+            <a:lvl9pPr marL="3886200" indent="-228600" algn="l" eaLnBrk="1" fontAlgn="base" hangingPunct="1">
+              <a:spcBef>
+                <a:spcPct val="20000"/>
+              </a:spcBef>
+              <a:spcAft>
+                <a:spcPct val="0"/>
+              </a:spcAft>
+              <a:buClr>
+                <a:schemeClr val="accent1">
+                  <a:alpha val="100000"/>
+                </a:schemeClr>
+              </a:buClr>
+              <a:buFont typeface="Wingdings"/>
+              <a:buChar char=""/>
+              <a:defRPr sz="1400" b="1">
+                <a:solidFill>
+                  <a:schemeClr val="tx1">
+                    <a:alpha val="100000"/>
+                  </a:schemeClr>
+                </a:solidFill>
+                <a:latin typeface="+mn-lt"/>
+              </a:defRPr>
+            </a:lvl9pPr>
+          </a:lstStyle>
+          <a:p>
+            <a:pPr marL="0" indent="0">
+              <a:buFont typeface="Wingdings" pitchFamily="2" charset="2"/>
+              <a:buNone/>
+            </a:pPr>
+            <a:r>
+              <a:rPr lang="en-GB" sz="1400" kern="0" dirty="0" smtClean="0"/>
+              <a:t>Command Binding</a:t>
+            </a:r>
+            <a:endParaRPr lang="en-GB" sz="1400" kern="0" dirty="0"/>
+          </a:p>
+        </p:txBody>
+      </p:sp>
+      <p:cxnSp>
+        <p:nvCxnSpPr>
+          <p:cNvPr id="23" name="Straight Arrow Connector 22"/>
+          <p:cNvCxnSpPr/>
+          <p:nvPr/>
+        </p:nvCxnSpPr>
+        <p:spPr bwMode="auto">
+          <a:xfrm flipH="1">
+            <a:off x="4343400" y="1676400"/>
+            <a:ext cx="1676400" cy="304800"/>
+          </a:xfrm>
+          <a:prstGeom prst="straightConnector1">
+            <a:avLst/>
+          </a:prstGeom>
+          <a:ln w="63500">
+            <a:solidFill>
+              <a:schemeClr val="tx1"/>
+            </a:solidFill>
+            <a:headEnd type="none" w="med" len="med"/>
+            <a:tailEnd type="triangle"/>
+          </a:ln>
+        </p:spPr>
+        <p:style>
+          <a:lnRef idx="1">
+            <a:schemeClr val="accent2"/>
+          </a:lnRef>
+          <a:fillRef idx="0">
+            <a:schemeClr val="accent2"/>
+          </a:fillRef>
+          <a:effectRef idx="0">
+            <a:schemeClr val="accent2"/>
+          </a:effectRef>
+          <a:fontRef idx="minor">
+            <a:schemeClr val="tx1"/>
+          </a:fontRef>
+        </p:style>
+      </p:cxnSp>
+      <p:sp>
+        <p:nvSpPr>
+          <p:cNvPr id="24" name="TextBox 23"/>
+          <p:cNvSpPr txBox="1"/>
+          <p:nvPr/>
+        </p:nvSpPr>
+        <p:spPr bwMode="auto">
+          <a:xfrm>
+            <a:off x="6070417" y="1334869"/>
+            <a:ext cx="2446311" cy="646331"/>
+          </a:xfrm>
+          <a:prstGeom prst="rect">
+            <a:avLst/>
+          </a:prstGeom>
+          <a:noFill/>
+          <a:ln w="9525">
+            <a:noFill/>
+            <a:miter lim="800000"/>
+            <a:headEnd/>
+            <a:tailEnd/>
+          </a:ln>
+        </p:spPr>
+        <p:txBody>
+          <a:bodyPr wrap="square" rtlCol="0">
+            <a:spAutoFit/>
+          </a:bodyPr>
+          <a:lstStyle/>
+          <a:p>
+            <a:r>
+              <a:rPr lang="en-US" dirty="0" smtClean="0">
+                <a:solidFill>
+                  <a:prstClr val="black"/>
+                </a:solidFill>
+                <a:latin typeface="Myriad Pro"/>
+              </a:rPr>
+              <a:t>Bound property implements </a:t>
+            </a:r>
+            <a:r>
+              <a:rPr lang="en-US" dirty="0" err="1" smtClean="0">
+                <a:solidFill>
+                  <a:prstClr val="black"/>
+                </a:solidFill>
+                <a:latin typeface="Myriad Pro"/>
+              </a:rPr>
+              <a:t>ICommand</a:t>
+            </a:r>
+            <a:endParaRPr lang="en-US" dirty="0">
+              <a:solidFill>
+                <a:prstClr val="black"/>
+              </a:solidFill>
+              <a:latin typeface="Myriad Pro"/>
+            </a:endParaRPr>
+          </a:p>
+        </p:txBody>
+      </p:sp>
+      <p:cxnSp>
+        <p:nvCxnSpPr>
+          <p:cNvPr id="25" name="Straight Arrow Connector 24"/>
+          <p:cNvCxnSpPr/>
+          <p:nvPr/>
+        </p:nvCxnSpPr>
+        <p:spPr bwMode="auto">
+          <a:xfrm flipV="1">
+            <a:off x="6055177" y="3129964"/>
+            <a:ext cx="0" cy="433070"/>
+          </a:xfrm>
+          <a:prstGeom prst="straightConnector1">
+            <a:avLst/>
+          </a:prstGeom>
+          <a:ln w="63500">
+            <a:solidFill>
+              <a:schemeClr val="tx1"/>
+            </a:solidFill>
+            <a:headEnd type="none" w="med" len="med"/>
+            <a:tailEnd type="triangle"/>
+          </a:ln>
+        </p:spPr>
+        <p:style>
+          <a:lnRef idx="1">
+            <a:schemeClr val="accent2"/>
+          </a:lnRef>
+          <a:fillRef idx="0">
+            <a:schemeClr val="accent2"/>
+          </a:fillRef>
+          <a:effectRef idx="0">
+            <a:schemeClr val="accent2"/>
+          </a:effectRef>
+          <a:fontRef idx="minor">
+            <a:schemeClr val="tx1"/>
+          </a:fontRef>
+        </p:style>
+      </p:cxnSp>
+      <p:sp>
+        <p:nvSpPr>
+          <p:cNvPr id="26" name="TextBox 25"/>
+          <p:cNvSpPr txBox="1"/>
+          <p:nvPr/>
+        </p:nvSpPr>
+        <p:spPr bwMode="auto">
+          <a:xfrm>
+            <a:off x="5080979" y="3563034"/>
+            <a:ext cx="2446311" cy="646331"/>
+          </a:xfrm>
+          <a:prstGeom prst="rect">
+            <a:avLst/>
+          </a:prstGeom>
+          <a:noFill/>
+          <a:ln w="9525">
+            <a:noFill/>
+            <a:miter lim="800000"/>
+            <a:headEnd/>
+            <a:tailEnd/>
+          </a:ln>
+        </p:spPr>
+        <p:txBody>
+          <a:bodyPr wrap="square" rtlCol="0">
+            <a:spAutoFit/>
+          </a:bodyPr>
+          <a:lstStyle/>
+          <a:p>
+            <a:r>
+              <a:rPr lang="en-US" dirty="0" smtClean="0">
+                <a:solidFill>
+                  <a:prstClr val="black"/>
+                </a:solidFill>
+                <a:latin typeface="Myriad Pro"/>
+              </a:rPr>
+              <a:t>Provide methods to handle click action</a:t>
+            </a:r>
+            <a:endParaRPr lang="en-US" dirty="0">
+              <a:solidFill>
+                <a:prstClr val="black"/>
+              </a:solidFill>
+              <a:latin typeface="Myriad Pro"/>
+            </a:endParaRPr>
+          </a:p>
+        </p:txBody>
+      </p:sp>
+      <p:cxnSp>
+        <p:nvCxnSpPr>
+          <p:cNvPr id="27" name="Straight Arrow Connector 26"/>
+          <p:cNvCxnSpPr/>
+          <p:nvPr/>
+        </p:nvCxnSpPr>
+        <p:spPr bwMode="auto">
+          <a:xfrm flipH="1">
+            <a:off x="5029200" y="4636532"/>
+            <a:ext cx="990600" cy="76200"/>
+          </a:xfrm>
+          <a:prstGeom prst="straightConnector1">
+            <a:avLst/>
+          </a:prstGeom>
+          <a:ln w="63500">
+            <a:solidFill>
+              <a:schemeClr val="tx1"/>
+            </a:solidFill>
+            <a:headEnd type="none" w="med" len="med"/>
+            <a:tailEnd type="triangle"/>
+          </a:ln>
+        </p:spPr>
+        <p:style>
+          <a:lnRef idx="1">
+            <a:schemeClr val="accent2"/>
+          </a:lnRef>
+          <a:fillRef idx="0">
+            <a:schemeClr val="accent2"/>
+          </a:fillRef>
+          <a:effectRef idx="0">
+            <a:schemeClr val="accent2"/>
+          </a:effectRef>
+          <a:fontRef idx="minor">
+            <a:schemeClr val="tx1"/>
+          </a:fontRef>
+        </p:style>
+      </p:cxnSp>
+      <p:sp>
+        <p:nvSpPr>
+          <p:cNvPr id="28" name="TextBox 27"/>
+          <p:cNvSpPr txBox="1"/>
+          <p:nvPr/>
+        </p:nvSpPr>
+        <p:spPr bwMode="auto">
+          <a:xfrm>
+            <a:off x="6070417" y="4419600"/>
+            <a:ext cx="2446311" cy="646331"/>
+          </a:xfrm>
+          <a:prstGeom prst="rect">
+            <a:avLst/>
+          </a:prstGeom>
+          <a:noFill/>
+          <a:ln w="9525">
+            <a:noFill/>
+            <a:miter lim="800000"/>
+            <a:headEnd/>
+            <a:tailEnd/>
+          </a:ln>
+        </p:spPr>
+        <p:txBody>
+          <a:bodyPr wrap="square" rtlCol="0">
+            <a:spAutoFit/>
+          </a:bodyPr>
+          <a:lstStyle/>
+          <a:p>
+            <a:r>
+              <a:rPr lang="en-US" dirty="0" smtClean="0">
+                <a:solidFill>
+                  <a:prstClr val="black"/>
+                </a:solidFill>
+                <a:latin typeface="Myriad Pro"/>
+              </a:rPr>
+              <a:t>Bind to our </a:t>
+            </a:r>
+            <a:r>
+              <a:rPr lang="en-US" dirty="0" err="1" smtClean="0">
+                <a:solidFill>
+                  <a:prstClr val="black"/>
+                </a:solidFill>
+                <a:latin typeface="Myriad Pro"/>
+              </a:rPr>
+              <a:t>ICommand</a:t>
+            </a:r>
+            <a:r>
+              <a:rPr lang="en-US" dirty="0" smtClean="0">
+                <a:solidFill>
+                  <a:prstClr val="black"/>
+                </a:solidFill>
+                <a:latin typeface="Myriad Pro"/>
+              </a:rPr>
+              <a:t> in the View Model</a:t>
+            </a:r>
+            <a:endParaRPr lang="en-US" dirty="0">
+              <a:solidFill>
+                <a:prstClr val="black"/>
+              </a:solidFill>
+              <a:latin typeface="Myriad Pro"/>
+            </a:endParaRPr>
+          </a:p>
+        </p:txBody>
+      </p:sp>
+    </p:spTree>
+    <p:extLst>
+      <p:ext uri="{BB962C8B-B14F-4D97-AF65-F5344CB8AC3E}">
+        <p14:creationId xmlns:p14="http://schemas.microsoft.com/office/powerpoint/2010/main" val="3313691003"/>
+      </p:ext>
+    </p:extLst>
+  </p:cSld>
+  <p:clrMapOvr>
+    <a:masterClrMapping/>
+  </p:clrMapOvr>
+  <p:transition>
+    <p:fade/>
+  </p:transition>
+  <p:timing>
+    <p:tnLst>
+      <p:par>
+        <p:cTn id="1" dur="indefinite" restart="never" nodeType="tmRoot">
+          <p:childTnLst>
+            <p:seq concurrent="1" nextAc="seek">
+              <p:cTn id="2" dur="indefinite" nodeType="mainSeq">
+                <p:childTnLst>
+                  <p:par>
+                    <p:cTn id="3" fill="hold">
+                      <p:stCondLst>
+                        <p:cond delay="indefinite"/>
+                        <p:cond evt="onBegin" delay="0">
+                          <p:tn val="2"/>
+                        </p:cond>
+                      </p:stCondLst>
+                      <p:childTnLst>
+                        <p:par>
+                          <p:cTn id="4" fill="hold">
+                            <p:stCondLst>
+                              <p:cond delay="0"/>
+                            </p:stCondLst>
+                            <p:childTnLst>
+                              <p:par>
+                                <p:cTn id="5" presetID="1" presetClass="entr" presetSubtype="0" fill="hold" nodeType="withEffect">
+                                  <p:stCondLst>
+                                    <p:cond delay="0"/>
+                                  </p:stCondLst>
+                                  <p:childTnLst>
+                                    <p:set>
+                                      <p:cBhvr>
+                                        <p:cTn id="6" dur="1" fill="hold">
+                                          <p:stCondLst>
+                                            <p:cond delay="0"/>
+                                          </p:stCondLst>
+                                        </p:cTn>
+                                        <p:tgtEl>
+                                          <p:spTgt spid="9"/>
+                                        </p:tgtEl>
+                                        <p:attrNameLst>
+                                          <p:attrName>style.visibility</p:attrName>
+                                        </p:attrNameLst>
+                                      </p:cBhvr>
+                                      <p:to>
+                                        <p:strVal val="visible"/>
+                                      </p:to>
+                                    </p:set>
+                                  </p:childTnLst>
+                                </p:cTn>
+                              </p:par>
+                              <p:par>
+                                <p:cTn id="7" presetID="1" presetClass="entr" presetSubtype="0" fill="hold" grpId="0" nodeType="withEffect">
+                                  <p:stCondLst>
+                                    <p:cond delay="0"/>
+                                  </p:stCondLst>
+                                  <p:childTnLst>
+                                    <p:set>
+                                      <p:cBhvr>
+                                        <p:cTn id="8" dur="1" fill="hold">
+                                          <p:stCondLst>
+                                            <p:cond delay="0"/>
+                                          </p:stCondLst>
+                                        </p:cTn>
+                                        <p:tgtEl>
+                                          <p:spTgt spid="3">
+                                            <p:txEl>
+                                              <p:pRg st="0" end="0"/>
+                                            </p:txEl>
+                                          </p:spTgt>
+                                        </p:tgtEl>
+                                        <p:attrNameLst>
+                                          <p:attrName>style.visibility</p:attrName>
+                                        </p:attrNameLst>
+                                      </p:cBhvr>
+                                      <p:to>
+                                        <p:strVal val="visible"/>
+                                      </p:to>
+                                    </p:set>
+                                  </p:childTnLst>
+                                </p:cTn>
+                              </p:par>
+                            </p:childTnLst>
+                          </p:cTn>
+                        </p:par>
+                      </p:childTnLst>
+                    </p:cTn>
+                  </p:par>
+                  <p:par>
+                    <p:cTn id="9" fill="hold">
+                      <p:stCondLst>
+                        <p:cond delay="indefinite"/>
+                      </p:stCondLst>
+                      <p:childTnLst>
+                        <p:par>
+                          <p:cTn id="10" fill="hold">
+                            <p:stCondLst>
+                              <p:cond delay="0"/>
+                            </p:stCondLst>
+                            <p:childTnLst>
+                              <p:par>
+                                <p:cTn id="11" presetID="1" presetClass="entr" presetSubtype="0" fill="hold" grpId="0" nodeType="clickEffect">
+                                  <p:stCondLst>
+                                    <p:cond delay="0"/>
+                                  </p:stCondLst>
+                                  <p:childTnLst>
+                                    <p:set>
+                                      <p:cBhvr>
+                                        <p:cTn id="12" dur="1" fill="hold">
+                                          <p:stCondLst>
+                                            <p:cond delay="0"/>
+                                          </p:stCondLst>
+                                        </p:cTn>
+                                        <p:tgtEl>
+                                          <p:spTgt spid="24"/>
+                                        </p:tgtEl>
+                                        <p:attrNameLst>
+                                          <p:attrName>style.visibility</p:attrName>
+                                        </p:attrNameLst>
+                                      </p:cBhvr>
+                                      <p:to>
+                                        <p:strVal val="visible"/>
+                                      </p:to>
+                                    </p:set>
+                                  </p:childTnLst>
+                                </p:cTn>
+                              </p:par>
+                              <p:par>
+                                <p:cTn id="13" presetID="1" presetClass="entr" presetSubtype="0" fill="hold" nodeType="withEffect">
+                                  <p:stCondLst>
+                                    <p:cond delay="0"/>
+                                  </p:stCondLst>
+                                  <p:childTnLst>
+                                    <p:set>
+                                      <p:cBhvr>
+                                        <p:cTn id="14" dur="1" fill="hold">
+                                          <p:stCondLst>
+                                            <p:cond delay="0"/>
+                                          </p:stCondLst>
+                                        </p:cTn>
+                                        <p:tgtEl>
+                                          <p:spTgt spid="23"/>
+                                        </p:tgtEl>
+                                        <p:attrNameLst>
+                                          <p:attrName>style.visibility</p:attrName>
+                                        </p:attrNameLst>
+                                      </p:cBhvr>
+                                      <p:to>
+                                        <p:strVal val="visible"/>
+                                      </p:to>
+                                    </p:set>
+                                  </p:childTnLst>
+                                </p:cTn>
+                              </p:par>
+                            </p:childTnLst>
+                          </p:cTn>
+                        </p:par>
+                      </p:childTnLst>
+                    </p:cTn>
+                  </p:par>
+                  <p:par>
+                    <p:cTn id="15" fill="hold">
+                      <p:stCondLst>
+                        <p:cond delay="indefinite"/>
+                      </p:stCondLst>
+                      <p:childTnLst>
+                        <p:par>
+                          <p:cTn id="16" fill="hold">
+                            <p:stCondLst>
+                              <p:cond delay="0"/>
+                            </p:stCondLst>
+                            <p:childTnLst>
+                              <p:par>
+                                <p:cTn id="17" presetID="1" presetClass="entr" presetSubtype="0" fill="hold" grpId="0" nodeType="clickEffect">
+                                  <p:stCondLst>
+                                    <p:cond delay="0"/>
+                                  </p:stCondLst>
+                                  <p:childTnLst>
+                                    <p:set>
+                                      <p:cBhvr>
+                                        <p:cTn id="18" dur="1" fill="hold">
+                                          <p:stCondLst>
+                                            <p:cond delay="0"/>
+                                          </p:stCondLst>
+                                        </p:cTn>
+                                        <p:tgtEl>
+                                          <p:spTgt spid="26"/>
+                                        </p:tgtEl>
+                                        <p:attrNameLst>
+                                          <p:attrName>style.visibility</p:attrName>
+                                        </p:attrNameLst>
+                                      </p:cBhvr>
+                                      <p:to>
+                                        <p:strVal val="visible"/>
+                                      </p:to>
+                                    </p:set>
+                                  </p:childTnLst>
+                                </p:cTn>
+                              </p:par>
+                              <p:par>
+                                <p:cTn id="19" presetID="1" presetClass="entr" presetSubtype="0" fill="hold" nodeType="withEffect">
+                                  <p:stCondLst>
+                                    <p:cond delay="0"/>
+                                  </p:stCondLst>
+                                  <p:childTnLst>
+                                    <p:set>
+                                      <p:cBhvr>
+                                        <p:cTn id="20" dur="1" fill="hold">
+                                          <p:stCondLst>
+                                            <p:cond delay="0"/>
+                                          </p:stCondLst>
+                                        </p:cTn>
+                                        <p:tgtEl>
+                                          <p:spTgt spid="25"/>
+                                        </p:tgtEl>
+                                        <p:attrNameLst>
+                                          <p:attrName>style.visibility</p:attrName>
+                                        </p:attrNameLst>
+                                      </p:cBhvr>
+                                      <p:to>
+                                        <p:strVal val="visible"/>
+                                      </p:to>
+                                    </p:set>
+                                  </p:childTnLst>
+                                </p:cTn>
+                              </p:par>
+                              <p:par>
+                                <p:cTn id="21" presetID="10" presetClass="exit" presetSubtype="0" fill="hold" grpId="1" nodeType="withEffect">
+                                  <p:stCondLst>
+                                    <p:cond delay="0"/>
+                                  </p:stCondLst>
+                                  <p:childTnLst>
+                                    <p:animEffect transition="out" filter="fade">
+                                      <p:cBhvr>
+                                        <p:cTn id="22" dur="500"/>
+                                        <p:tgtEl>
+                                          <p:spTgt spid="24"/>
+                                        </p:tgtEl>
+                                      </p:cBhvr>
+                                    </p:animEffect>
+                                    <p:set>
+                                      <p:cBhvr>
+                                        <p:cTn id="23" dur="1" fill="hold">
+                                          <p:stCondLst>
+                                            <p:cond delay="499"/>
+                                          </p:stCondLst>
+                                        </p:cTn>
+                                        <p:tgtEl>
+                                          <p:spTgt spid="24"/>
+                                        </p:tgtEl>
+                                        <p:attrNameLst>
+                                          <p:attrName>style.visibility</p:attrName>
+                                        </p:attrNameLst>
+                                      </p:cBhvr>
+                                      <p:to>
+                                        <p:strVal val="hidden"/>
+                                      </p:to>
+                                    </p:set>
+                                  </p:childTnLst>
+                                </p:cTn>
+                              </p:par>
+                              <p:par>
+                                <p:cTn id="24" presetID="10" presetClass="exit" presetSubtype="0" fill="hold" nodeType="withEffect">
+                                  <p:stCondLst>
+                                    <p:cond delay="0"/>
+                                  </p:stCondLst>
+                                  <p:childTnLst>
+                                    <p:animEffect transition="out" filter="fade">
+                                      <p:cBhvr>
+                                        <p:cTn id="25" dur="500"/>
+                                        <p:tgtEl>
+                                          <p:spTgt spid="23"/>
+                                        </p:tgtEl>
+                                      </p:cBhvr>
+                                    </p:animEffect>
+                                    <p:set>
+                                      <p:cBhvr>
+                                        <p:cTn id="26" dur="1" fill="hold">
+                                          <p:stCondLst>
+                                            <p:cond delay="499"/>
+                                          </p:stCondLst>
+                                        </p:cTn>
+                                        <p:tgtEl>
+                                          <p:spTgt spid="23"/>
+                                        </p:tgtEl>
+                                        <p:attrNameLst>
+                                          <p:attrName>style.visibility</p:attrName>
+                                        </p:attrNameLst>
+                                      </p:cBhvr>
+                                      <p:to>
+                                        <p:strVal val="hidden"/>
+                                      </p:to>
+                                    </p:set>
+                                  </p:childTnLst>
+                                </p:cTn>
+                              </p:par>
+                            </p:childTnLst>
+                          </p:cTn>
+                        </p:par>
+                      </p:childTnLst>
+                    </p:cTn>
+                  </p:par>
+                  <p:par>
+                    <p:cTn id="27" fill="hold">
+                      <p:stCondLst>
+                        <p:cond delay="indefinite"/>
+                      </p:stCondLst>
+                      <p:childTnLst>
+                        <p:par>
+                          <p:cTn id="28" fill="hold">
+                            <p:stCondLst>
+                              <p:cond delay="0"/>
+                            </p:stCondLst>
+                            <p:childTnLst>
+                              <p:par>
+                                <p:cTn id="29" presetID="1" presetClass="entr" presetSubtype="0" fill="hold" grpId="0" nodeType="clickEffect">
+                                  <p:stCondLst>
+                                    <p:cond delay="0"/>
+                                  </p:stCondLst>
+                                  <p:childTnLst>
+                                    <p:set>
+                                      <p:cBhvr>
+                                        <p:cTn id="30" dur="1" fill="hold">
+                                          <p:stCondLst>
+                                            <p:cond delay="0"/>
+                                          </p:stCondLst>
+                                        </p:cTn>
+                                        <p:tgtEl>
+                                          <p:spTgt spid="20"/>
+                                        </p:tgtEl>
+                                        <p:attrNameLst>
+                                          <p:attrName>style.visibility</p:attrName>
+                                        </p:attrNameLst>
+                                      </p:cBhvr>
+                                      <p:to>
+                                        <p:strVal val="visible"/>
+                                      </p:to>
+                                    </p:set>
+                                  </p:childTnLst>
+                                </p:cTn>
+                              </p:par>
+                              <p:par>
+                                <p:cTn id="31" presetID="1" presetClass="entr" presetSubtype="0" fill="hold" nodeType="withEffect">
+                                  <p:stCondLst>
+                                    <p:cond delay="0"/>
+                                  </p:stCondLst>
+                                  <p:childTnLst>
+                                    <p:set>
+                                      <p:cBhvr>
+                                        <p:cTn id="32" dur="1" fill="hold">
+                                          <p:stCondLst>
+                                            <p:cond delay="0"/>
+                                          </p:stCondLst>
+                                        </p:cTn>
+                                        <p:tgtEl>
+                                          <p:spTgt spid="4"/>
+                                        </p:tgtEl>
+                                        <p:attrNameLst>
+                                          <p:attrName>style.visibility</p:attrName>
+                                        </p:attrNameLst>
+                                      </p:cBhvr>
+                                      <p:to>
+                                        <p:strVal val="visible"/>
+                                      </p:to>
+                                    </p:set>
+                                  </p:childTnLst>
+                                </p:cTn>
+                              </p:par>
+                              <p:par>
+                                <p:cTn id="33" presetID="10" presetClass="exit" presetSubtype="0" fill="hold" grpId="1" nodeType="withEffect">
+                                  <p:stCondLst>
+                                    <p:cond delay="0"/>
+                                  </p:stCondLst>
+                                  <p:childTnLst>
+                                    <p:animEffect transition="out" filter="fade">
+                                      <p:cBhvr>
+                                        <p:cTn id="34" dur="500"/>
+                                        <p:tgtEl>
+                                          <p:spTgt spid="26"/>
+                                        </p:tgtEl>
+                                      </p:cBhvr>
+                                    </p:animEffect>
+                                    <p:set>
+                                      <p:cBhvr>
+                                        <p:cTn id="35" dur="1" fill="hold">
+                                          <p:stCondLst>
+                                            <p:cond delay="499"/>
+                                          </p:stCondLst>
+                                        </p:cTn>
+                                        <p:tgtEl>
+                                          <p:spTgt spid="26"/>
+                                        </p:tgtEl>
+                                        <p:attrNameLst>
+                                          <p:attrName>style.visibility</p:attrName>
+                                        </p:attrNameLst>
+                                      </p:cBhvr>
+                                      <p:to>
+                                        <p:strVal val="hidden"/>
+                                      </p:to>
+                                    </p:set>
+                                  </p:childTnLst>
+                                </p:cTn>
+                              </p:par>
+                              <p:par>
+                                <p:cTn id="36" presetID="10" presetClass="exit" presetSubtype="0" fill="hold" nodeType="withEffect">
+                                  <p:stCondLst>
+                                    <p:cond delay="0"/>
+                                  </p:stCondLst>
+                                  <p:childTnLst>
+                                    <p:animEffect transition="out" filter="fade">
+                                      <p:cBhvr>
+                                        <p:cTn id="37" dur="500"/>
+                                        <p:tgtEl>
+                                          <p:spTgt spid="25"/>
+                                        </p:tgtEl>
+                                      </p:cBhvr>
+                                    </p:animEffect>
+                                    <p:set>
+                                      <p:cBhvr>
+                                        <p:cTn id="38" dur="1" fill="hold">
+                                          <p:stCondLst>
+                                            <p:cond delay="499"/>
+                                          </p:stCondLst>
+                                        </p:cTn>
+                                        <p:tgtEl>
+                                          <p:spTgt spid="25"/>
+                                        </p:tgtEl>
+                                        <p:attrNameLst>
+                                          <p:attrName>style.visibility</p:attrName>
+                                        </p:attrNameLst>
+                                      </p:cBhvr>
+                                      <p:to>
+                                        <p:strVal val="hidden"/>
+                                      </p:to>
+                                    </p:set>
+                                  </p:childTnLst>
+                                </p:cTn>
+                              </p:par>
+                            </p:childTnLst>
+                          </p:cTn>
+                        </p:par>
+                      </p:childTnLst>
+                    </p:cTn>
+                  </p:par>
+                  <p:par>
+                    <p:cTn id="39" fill="hold">
+                      <p:stCondLst>
+                        <p:cond delay="indefinite"/>
+                      </p:stCondLst>
+                      <p:childTnLst>
+                        <p:par>
+                          <p:cTn id="40" fill="hold">
+                            <p:stCondLst>
+                              <p:cond delay="0"/>
+                            </p:stCondLst>
+                            <p:childTnLst>
+                              <p:par>
+                                <p:cTn id="41" presetID="1" presetClass="entr" presetSubtype="0" fill="hold" grpId="0" nodeType="clickEffect">
+                                  <p:stCondLst>
+                                    <p:cond delay="0"/>
+                                  </p:stCondLst>
+                                  <p:childTnLst>
+                                    <p:set>
+                                      <p:cBhvr>
+                                        <p:cTn id="42" dur="1" fill="hold">
+                                          <p:stCondLst>
+                                            <p:cond delay="0"/>
+                                          </p:stCondLst>
+                                        </p:cTn>
+                                        <p:tgtEl>
+                                          <p:spTgt spid="28"/>
+                                        </p:tgtEl>
+                                        <p:attrNameLst>
+                                          <p:attrName>style.visibility</p:attrName>
+                                        </p:attrNameLst>
+                                      </p:cBhvr>
+                                      <p:to>
+                                        <p:strVal val="visible"/>
+                                      </p:to>
+                                    </p:set>
+                                  </p:childTnLst>
+                                </p:cTn>
+                              </p:par>
+                              <p:par>
+                                <p:cTn id="43" presetID="1" presetClass="entr" presetSubtype="0" fill="hold" nodeType="withEffect">
+                                  <p:stCondLst>
+                                    <p:cond delay="0"/>
+                                  </p:stCondLst>
+                                  <p:childTnLst>
+                                    <p:set>
+                                      <p:cBhvr>
+                                        <p:cTn id="44" dur="1" fill="hold">
+                                          <p:stCondLst>
+                                            <p:cond delay="0"/>
+                                          </p:stCondLst>
+                                        </p:cTn>
+                                        <p:tgtEl>
+                                          <p:spTgt spid="27"/>
+                                        </p:tgtEl>
+                                        <p:attrNameLst>
+                                          <p:attrName>style.visibility</p:attrName>
+                                        </p:attrNameLst>
+                                      </p:cBhvr>
+                                      <p:to>
+                                        <p:strVal val="visible"/>
+                                      </p:to>
+                                    </p:set>
+                                  </p:childTnLst>
+                                </p:cTn>
+                              </p:par>
+                            </p:childTnLst>
+                          </p:cTn>
+                        </p:par>
+                      </p:childTnLst>
+                    </p:cTn>
+                  </p:par>
+                </p:childTnLst>
+              </p:cTn>
+              <p:prevCondLst>
+                <p:cond evt="onPrev" delay="0">
+                  <p:tgtEl>
+                    <p:sldTgt/>
+                  </p:tgtEl>
+                </p:cond>
+              </p:prevCondLst>
+              <p:nextCondLst>
+                <p:cond evt="onNext" delay="0">
+                  <p:tgtEl>
+                    <p:sldTgt/>
+                  </p:tgtEl>
+                </p:cond>
+              </p:nextCondLst>
+            </p:seq>
+          </p:childTnLst>
+        </p:cTn>
+      </p:par>
+    </p:tnLst>
+    <p:bldLst>
+      <p:bldP spid="3" grpId="0" build="p"/>
+      <p:bldP spid="20" grpId="0"/>
+      <p:bldP spid="24" grpId="0"/>
+      <p:bldP spid="24" grpId="1"/>
+      <p:bldP spid="26" grpId="0"/>
+      <p:bldP spid="26" grpId="1"/>
+      <p:bldP spid="28" grpId="0"/>
+    </p:bldLst>
+  </p:timing>
+</p:sld>
+</file>
+
+<file path=ppt/slides/slide7.xml><?xml version="1.0" encoding="utf-8"?>
+<p:sld xmlns:a="http://schemas.openxmlformats.org/drawingml/2006/main" xmlns:r="http://schemas.openxmlformats.org/officeDocument/2006/relationships" xmlns:p="http://schemas.openxmlformats.org/presentationml/2006/main" show="0">
+  <p:cSld>
+    <p:bg>
+      <p:bgPr>
+        <a:solidFill>
+          <a:schemeClr val="accent2"/>
+        </a:solidFill>
+        <a:effectLst/>
+      </p:bgPr>
+    </p:bg>
+    <p:spTree>
+      <p:nvGrpSpPr>
+        <p:cNvPr id="1" name=""/>
+        <p:cNvGrpSpPr/>
+        <p:nvPr/>
+      </p:nvGrpSpPr>
+      <p:grpSpPr>
+        <a:xfrm>
+          <a:off x="0" y="0"/>
+          <a:ext cx="0" cy="0"/>
+          <a:chOff x="0" y="0"/>
+          <a:chExt cx="0" cy="0"/>
+        </a:xfrm>
+      </p:grpSpPr>
+      <p:sp>
+        <p:nvSpPr>
+          <p:cNvPr id="2" name="Title 1"/>
+          <p:cNvSpPr>
+            <a:spLocks noGrp="1"/>
+          </p:cNvSpPr>
+          <p:nvPr>
+            <p:ph type="title"/>
+          </p:nvPr>
+        </p:nvSpPr>
+        <p:spPr/>
+        <p:txBody>
+          <a:bodyPr/>
+          <a:lstStyle/>
+          <a:p>
+            <a:r>
+              <a:rPr lang="en-US" dirty="0" smtClean="0"/>
+              <a:t>END OF Overview Slides		</a:t>
+            </a:r>
+            <a:endParaRPr lang="en-GB" dirty="0"/>
+          </a:p>
+        </p:txBody>
+      </p:sp>
+      <p:sp>
+        <p:nvSpPr>
+          <p:cNvPr id="3" name="Text Placeholder 2"/>
+          <p:cNvSpPr>
+            <a:spLocks noGrp="1"/>
+          </p:cNvSpPr>
+          <p:nvPr>
+            <p:ph type="body" idx="1"/>
+          </p:nvPr>
+        </p:nvSpPr>
+        <p:spPr/>
+        <p:txBody>
+          <a:bodyPr/>
+          <a:lstStyle/>
+          <a:p>
+            <a:pPr marL="0" indent="0">
+              <a:buNone/>
+            </a:pPr>
+            <a:r>
+              <a:rPr lang="en-GB" dirty="0" smtClean="0"/>
+              <a:t>	</a:t>
+            </a:r>
+            <a:endParaRPr lang="en-GB" dirty="0"/>
+          </a:p>
+        </p:txBody>
+      </p:sp>
+    </p:spTree>
+    <p:extLst>
+      <p:ext uri="{BB962C8B-B14F-4D97-AF65-F5344CB8AC3E}">
+        <p14:creationId xmlns:p14="http://schemas.microsoft.com/office/powerpoint/2010/main" val="1141513312"/>
+      </p:ext>
+    </p:extLst>
+  </p:cSld>
+  <p:clrMapOvr>
+    <a:masterClrMapping/>
+  </p:clrMapOvr>
+  <p:transition>
+    <p:fade/>
+  </p:transition>
+  <p:timing>
+    <p:tnLst>
+      <p:par>
+        <p:cTn id="1" dur="indefinite" restart="never" nodeType="tmRoot"/>
+      </p:par>
+    </p:tnLst>
+  </p:timing>
+</p:sld>
+</file>
+
+<file path=ppt/slides/slide8.xml><?xml version="1.0" encoding="utf-8"?>
 <p:sld xmlns:a="http://schemas.openxmlformats.org/drawingml/2006/main" xmlns:r="http://schemas.openxmlformats.org/officeDocument/2006/relationships" xmlns:p="http://schemas.openxmlformats.org/presentationml/2006/main">
   <p:cSld>
     <p:spTree>

</xml_diff>